<commit_message>
Added some reviewer responses and presentation
</commit_message>
<xml_diff>
--- a/Мясоедов_2014.pptx
+++ b/Мясоедов_2014.pptx
@@ -5,19 +5,23 @@
     <p:sldMasterId id="2147483660" r:id="rId1"/>
   </p:sldMasterIdLst>
   <p:notesMasterIdLst>
-    <p:notesMasterId r:id="rId12"/>
+    <p:notesMasterId r:id="rId16"/>
   </p:notesMasterIdLst>
   <p:sldIdLst>
     <p:sldId id="256" r:id="rId2"/>
     <p:sldId id="259" r:id="rId3"/>
-    <p:sldId id="257" r:id="rId4"/>
-    <p:sldId id="262" r:id="rId5"/>
-    <p:sldId id="260" r:id="rId6"/>
-    <p:sldId id="261" r:id="rId7"/>
-    <p:sldId id="264" r:id="rId8"/>
-    <p:sldId id="265" r:id="rId9"/>
-    <p:sldId id="266" r:id="rId10"/>
-    <p:sldId id="263" r:id="rId11"/>
+    <p:sldId id="267" r:id="rId4"/>
+    <p:sldId id="269" r:id="rId5"/>
+    <p:sldId id="257" r:id="rId6"/>
+    <p:sldId id="270" r:id="rId7"/>
+    <p:sldId id="260" r:id="rId8"/>
+    <p:sldId id="271" r:id="rId9"/>
+    <p:sldId id="261" r:id="rId10"/>
+    <p:sldId id="264" r:id="rId11"/>
+    <p:sldId id="265" r:id="rId12"/>
+    <p:sldId id="266" r:id="rId13"/>
+    <p:sldId id="263" r:id="rId14"/>
+    <p:sldId id="262" r:id="rId15"/>
   </p:sldIdLst>
   <p:sldSz cx="9144000" cy="6858000" type="screen4x3"/>
   <p:notesSz cx="6858000" cy="9144000"/>
@@ -218,7 +222,7 @@
             <a:fld id="{2B36ADF5-90D6-4F89-937A-A25D979E0EA3}" type="datetimeFigureOut">
               <a:rPr lang="en-US" smtClean="0"/>
               <a:pPr/>
-              <a:t>3/20/2014</a:t>
+              <a:t>3/31/2014</a:t>
             </a:fld>
             <a:endParaRPr lang="en-US"/>
           </a:p>
@@ -387,7 +391,7 @@
     </p:spTree>
     <p:extLst>
       <p:ext uri="{BB962C8B-B14F-4D97-AF65-F5344CB8AC3E}">
-        <p14:creationId xmlns="" xmlns:p14="http://schemas.microsoft.com/office/powerpoint/2010/main" val="102284906"/>
+        <p14:creationId xmlns:p14="http://schemas.microsoft.com/office/powerpoint/2010/main" xmlns="" val="102284906"/>
       </p:ext>
     </p:extLst>
   </p:cSld>
@@ -485,6 +489,1387 @@
     </a:lvl9pPr>
   </p:notesStyle>
 </p:notesMaster>
+</file>
+
+<file path=ppt/notesSlides/notesSlide1.xml><?xml version="1.0" encoding="utf-8"?>
+<p:notes xmlns:a="http://schemas.openxmlformats.org/drawingml/2006/main" xmlns:r="http://schemas.openxmlformats.org/officeDocument/2006/relationships" xmlns:p="http://schemas.openxmlformats.org/presentationml/2006/main">
+  <p:cSld>
+    <p:spTree>
+      <p:nvGrpSpPr>
+        <p:cNvPr id="1" name=""/>
+        <p:cNvGrpSpPr/>
+        <p:nvPr/>
+      </p:nvGrpSpPr>
+      <p:grpSpPr>
+        <a:xfrm>
+          <a:off x="0" y="0"/>
+          <a:ext cx="0" cy="0"/>
+          <a:chOff x="0" y="0"/>
+          <a:chExt cx="0" cy="0"/>
+        </a:xfrm>
+      </p:grpSpPr>
+      <p:sp>
+        <p:nvSpPr>
+          <p:cNvPr id="2" name="Slide Image Placeholder 1"/>
+          <p:cNvSpPr>
+            <a:spLocks noGrp="1" noRot="1" noChangeAspect="1"/>
+          </p:cNvSpPr>
+          <p:nvPr>
+            <p:ph type="sldImg"/>
+          </p:nvPr>
+        </p:nvSpPr>
+        <p:spPr/>
+      </p:sp>
+      <p:sp>
+        <p:nvSpPr>
+          <p:cNvPr id="3" name="Notes Placeholder 2"/>
+          <p:cNvSpPr>
+            <a:spLocks noGrp="1"/>
+          </p:cNvSpPr>
+          <p:nvPr>
+            <p:ph type="body" idx="1"/>
+          </p:nvPr>
+        </p:nvSpPr>
+        <p:spPr/>
+        <p:txBody>
+          <a:bodyPr>
+            <a:normAutofit fontScale="92500" lnSpcReduction="20000"/>
+          </a:bodyPr>
+          <a:lstStyle/>
+          <a:p>
+            <a:r>
+              <a:rPr lang="ru-RU" dirty="0" smtClean="0"/>
+              <a:t>В настоящее время ряд спутниковых геофизических продуктов находится в открытом доступе</a:t>
+            </a:r>
+            <a:r>
+              <a:rPr lang="en-US" dirty="0" smtClean="0"/>
+              <a:t> </a:t>
+            </a:r>
+            <a:r>
+              <a:rPr lang="en-US" dirty="0" err="1" smtClean="0"/>
+              <a:t>благодаря</a:t>
+            </a:r>
+            <a:r>
+              <a:rPr lang="en-US" dirty="0" smtClean="0"/>
+              <a:t> </a:t>
+            </a:r>
+            <a:r>
+              <a:rPr lang="en-US" dirty="0" err="1" smtClean="0"/>
+              <a:t>международным</a:t>
+            </a:r>
+            <a:r>
+              <a:rPr lang="en-US" dirty="0" smtClean="0"/>
+              <a:t> </a:t>
+            </a:r>
+            <a:r>
+              <a:rPr lang="en-US" dirty="0" err="1" smtClean="0"/>
+              <a:t>центрам</a:t>
+            </a:r>
+            <a:r>
+              <a:rPr lang="en-US" dirty="0" smtClean="0"/>
+              <a:t> </a:t>
+            </a:r>
+            <a:r>
+              <a:rPr lang="en-US" dirty="0" err="1" smtClean="0"/>
+              <a:t>данных</a:t>
+            </a:r>
+            <a:r>
+              <a:rPr lang="en-US" dirty="0" smtClean="0"/>
+              <a:t>:</a:t>
+            </a:r>
+          </a:p>
+          <a:p>
+            <a:r>
+              <a:rPr lang="en-US" sz="1200" kern="1200" dirty="0" smtClean="0">
+                <a:solidFill>
+                  <a:schemeClr val="tx1"/>
+                </a:solidFill>
+                <a:latin typeface="+mn-lt"/>
+                <a:ea typeface="+mn-ea"/>
+                <a:cs typeface="+mn-cs"/>
+              </a:rPr>
+              <a:t>PO</a:t>
+            </a:r>
+            <a:r>
+              <a:rPr lang="ru-RU" sz="1200" kern="1200" dirty="0" smtClean="0">
+                <a:solidFill>
+                  <a:schemeClr val="tx1"/>
+                </a:solidFill>
+                <a:latin typeface="+mn-lt"/>
+                <a:ea typeface="+mn-ea"/>
+                <a:cs typeface="+mn-cs"/>
+              </a:rPr>
+              <a:t>.</a:t>
+            </a:r>
+            <a:r>
+              <a:rPr lang="en-US" sz="1200" kern="1200" dirty="0" smtClean="0">
+                <a:solidFill>
+                  <a:schemeClr val="tx1"/>
+                </a:solidFill>
+                <a:latin typeface="+mn-lt"/>
+                <a:ea typeface="+mn-ea"/>
+                <a:cs typeface="+mn-cs"/>
+              </a:rPr>
+              <a:t>DAAC</a:t>
+            </a:r>
+            <a:r>
+              <a:rPr lang="ru-RU" sz="1200" kern="1200" dirty="0" smtClean="0">
+                <a:solidFill>
+                  <a:schemeClr val="tx1"/>
+                </a:solidFill>
+                <a:latin typeface="+mn-lt"/>
+                <a:ea typeface="+mn-ea"/>
+                <a:cs typeface="+mn-cs"/>
+              </a:rPr>
+              <a:t> – американский центр НАСА </a:t>
+            </a:r>
+            <a:endParaRPr lang="en-US" sz="1200" kern="1200" dirty="0" smtClean="0">
+              <a:solidFill>
+                <a:schemeClr val="tx1"/>
+              </a:solidFill>
+              <a:latin typeface="+mn-lt"/>
+              <a:ea typeface="+mn-ea"/>
+              <a:cs typeface="+mn-cs"/>
+            </a:endParaRPr>
+          </a:p>
+          <a:p>
+            <a:r>
+              <a:rPr lang="en-US" sz="1200" kern="1200" dirty="0" smtClean="0">
+                <a:solidFill>
+                  <a:schemeClr val="tx1"/>
+                </a:solidFill>
+                <a:latin typeface="+mn-lt"/>
+                <a:ea typeface="+mn-ea"/>
+                <a:cs typeface="+mn-cs"/>
+              </a:rPr>
+              <a:t>CERSAT </a:t>
+            </a:r>
+            <a:r>
+              <a:rPr lang="ru-RU" sz="1200" kern="1200" dirty="0" smtClean="0">
+                <a:solidFill>
+                  <a:schemeClr val="tx1"/>
+                </a:solidFill>
+                <a:latin typeface="+mn-lt"/>
+                <a:ea typeface="+mn-ea"/>
+                <a:cs typeface="+mn-cs"/>
+              </a:rPr>
+              <a:t>–</a:t>
+            </a:r>
+            <a:r>
+              <a:rPr lang="en-US" sz="1200" kern="1200" dirty="0" smtClean="0">
+                <a:solidFill>
+                  <a:schemeClr val="tx1"/>
+                </a:solidFill>
+                <a:latin typeface="+mn-lt"/>
+                <a:ea typeface="+mn-ea"/>
+                <a:cs typeface="+mn-cs"/>
+              </a:rPr>
+              <a:t> </a:t>
+            </a:r>
+            <a:r>
+              <a:rPr lang="ru-RU" sz="1200" kern="1200" dirty="0" smtClean="0">
+                <a:solidFill>
+                  <a:schemeClr val="tx1"/>
+                </a:solidFill>
+                <a:latin typeface="+mn-lt"/>
+                <a:ea typeface="+mn-ea"/>
+                <a:cs typeface="+mn-cs"/>
+              </a:rPr>
+              <a:t>французский центр данных института </a:t>
+            </a:r>
+            <a:r>
+              <a:rPr lang="en-US" sz="1200" kern="1200" dirty="0" smtClean="0">
+                <a:solidFill>
+                  <a:schemeClr val="tx1"/>
+                </a:solidFill>
+                <a:latin typeface="+mn-lt"/>
+                <a:ea typeface="+mn-ea"/>
+                <a:cs typeface="+mn-cs"/>
+              </a:rPr>
+              <a:t>IFREMER</a:t>
+            </a:r>
+          </a:p>
+          <a:p>
+            <a:r>
+              <a:rPr lang="ru-RU" sz="1200" kern="1200" dirty="0" smtClean="0">
+                <a:solidFill>
+                  <a:schemeClr val="tx1"/>
+                </a:solidFill>
+                <a:latin typeface="+mn-lt"/>
+                <a:ea typeface="+mn-ea"/>
+                <a:cs typeface="+mn-cs"/>
+              </a:rPr>
+              <a:t>информационный портал спутниковых данных РГГМУ </a:t>
+            </a:r>
+            <a:r>
+              <a:rPr lang="en-US" sz="1200" kern="1200" baseline="0" dirty="0" smtClean="0">
+                <a:solidFill>
+                  <a:schemeClr val="tx1"/>
+                </a:solidFill>
+                <a:latin typeface="+mn-lt"/>
+                <a:ea typeface="+mn-ea"/>
+                <a:cs typeface="+mn-cs"/>
+              </a:rPr>
+              <a:t>- </a:t>
+            </a:r>
+            <a:r>
+              <a:rPr lang="en-US" sz="1200" kern="1200" dirty="0" smtClean="0">
+                <a:solidFill>
+                  <a:schemeClr val="tx1"/>
+                </a:solidFill>
+                <a:latin typeface="+mn-lt"/>
+                <a:ea typeface="+mn-ea"/>
+                <a:cs typeface="+mn-cs"/>
+              </a:rPr>
+              <a:t>SATIN </a:t>
+            </a:r>
+            <a:endParaRPr lang="en-US" dirty="0" smtClean="0"/>
+          </a:p>
+          <a:p>
+            <a:endParaRPr lang="en-US" dirty="0" smtClean="0"/>
+          </a:p>
+          <a:p>
+            <a:r>
+              <a:rPr lang="ru-RU" dirty="0" smtClean="0"/>
+              <a:t>В то же время, перспективы развития исследований Земли из Космоса неизбежно требуют создания новых подходов и методов обработки, анализа и использования спутниковой информации.</a:t>
+            </a:r>
+            <a:endParaRPr lang="en-US" dirty="0" smtClean="0"/>
+          </a:p>
+          <a:p>
+            <a:endParaRPr lang="en-US" dirty="0" smtClean="0"/>
+          </a:p>
+          <a:p>
+            <a:r>
+              <a:rPr lang="ru-RU" dirty="0" smtClean="0"/>
+              <a:t>Оптические методы исследования Земли являются наиболее развитыми и широко используемыми в оперативной практике</a:t>
+            </a:r>
+            <a:r>
+              <a:rPr lang="en-US" dirty="0" smtClean="0"/>
+              <a:t>.</a:t>
+            </a:r>
+          </a:p>
+          <a:p>
+            <a:r>
+              <a:rPr lang="ru-RU" sz="1200" kern="1200" dirty="0" smtClean="0">
+                <a:solidFill>
+                  <a:schemeClr val="tx1"/>
+                </a:solidFill>
+                <a:latin typeface="+mn-lt"/>
+                <a:ea typeface="+mn-ea"/>
+                <a:cs typeface="+mn-cs"/>
+              </a:rPr>
+              <a:t>В настоящее время на орбите Земли находится большое количество сканеров, работающих в оптическом диапазоне (например, сканеры MODIS на спутниках </a:t>
+            </a:r>
+            <a:r>
+              <a:rPr lang="en-US" sz="1200" kern="1200" dirty="0" smtClean="0">
+                <a:solidFill>
+                  <a:schemeClr val="tx1"/>
+                </a:solidFill>
+                <a:latin typeface="+mn-lt"/>
+                <a:ea typeface="+mn-ea"/>
+                <a:cs typeface="+mn-cs"/>
+              </a:rPr>
+              <a:t>Terra</a:t>
+            </a:r>
+            <a:r>
+              <a:rPr lang="ru-RU" sz="1200" kern="1200" dirty="0" smtClean="0">
+                <a:solidFill>
+                  <a:schemeClr val="tx1"/>
+                </a:solidFill>
+                <a:latin typeface="+mn-lt"/>
+                <a:ea typeface="+mn-ea"/>
+                <a:cs typeface="+mn-cs"/>
+              </a:rPr>
+              <a:t> и </a:t>
+            </a:r>
+            <a:r>
+              <a:rPr lang="en-US" sz="1200" kern="1200" dirty="0" smtClean="0">
+                <a:solidFill>
+                  <a:schemeClr val="tx1"/>
+                </a:solidFill>
+                <a:latin typeface="+mn-lt"/>
+                <a:ea typeface="+mn-ea"/>
+                <a:cs typeface="+mn-cs"/>
+              </a:rPr>
+              <a:t>Aqua</a:t>
+            </a:r>
+            <a:r>
+              <a:rPr lang="ru-RU" sz="1200" kern="1200" dirty="0" smtClean="0">
+                <a:solidFill>
+                  <a:schemeClr val="tx1"/>
+                </a:solidFill>
+                <a:latin typeface="+mn-lt"/>
+                <a:ea typeface="+mn-ea"/>
+                <a:cs typeface="+mn-cs"/>
+              </a:rPr>
+              <a:t>, радиометры AVHRR на серии спутников NOAA).</a:t>
+            </a:r>
+            <a:endParaRPr lang="en-US" sz="1200" kern="1200" dirty="0" smtClean="0">
+              <a:solidFill>
+                <a:schemeClr val="tx1"/>
+              </a:solidFill>
+              <a:latin typeface="+mn-lt"/>
+              <a:ea typeface="+mn-ea"/>
+              <a:cs typeface="+mn-cs"/>
+            </a:endParaRPr>
+          </a:p>
+          <a:p>
+            <a:r>
+              <a:rPr lang="ru-RU" sz="1200" kern="1200" dirty="0" smtClean="0">
+                <a:solidFill>
+                  <a:schemeClr val="tx1"/>
+                </a:solidFill>
+                <a:latin typeface="+mn-lt"/>
+                <a:ea typeface="+mn-ea"/>
+                <a:cs typeface="+mn-cs"/>
+              </a:rPr>
+              <a:t>Одно из основных применений данных оптических сканеров, - изучение «цвета» Океана (содержание фитопланктона и минеральной взвеси, биогеохимические характеристики), а также температуры его поверхности.</a:t>
+            </a:r>
+            <a:endParaRPr lang="en-US" sz="1200" kern="1200" dirty="0" smtClean="0">
+              <a:solidFill>
+                <a:schemeClr val="tx1"/>
+              </a:solidFill>
+              <a:latin typeface="+mn-lt"/>
+              <a:ea typeface="+mn-ea"/>
+              <a:cs typeface="+mn-cs"/>
+            </a:endParaRPr>
+          </a:p>
+          <a:p>
+            <a:endParaRPr lang="en-US" sz="1200" kern="1200" dirty="0" smtClean="0">
+              <a:solidFill>
+                <a:schemeClr val="tx1"/>
+              </a:solidFill>
+              <a:latin typeface="+mn-lt"/>
+              <a:ea typeface="+mn-ea"/>
+              <a:cs typeface="+mn-cs"/>
+            </a:endParaRPr>
+          </a:p>
+          <a:p>
+            <a:r>
+              <a:rPr lang="ru-RU" sz="1200" kern="1200" dirty="0" smtClean="0">
+                <a:solidFill>
+                  <a:schemeClr val="tx1"/>
+                </a:solidFill>
+                <a:latin typeface="+mn-lt"/>
+                <a:ea typeface="+mn-ea"/>
+                <a:cs typeface="+mn-cs"/>
+              </a:rPr>
+              <a:t>При изучении оптических характеристик Океана, солнечная радиация, отраженная от морской поверхности, является шумом по отношению к радиации, рассеянной в верхнем слое Океана.</a:t>
+            </a:r>
+            <a:endParaRPr lang="en-US" sz="1200" kern="1200" dirty="0" smtClean="0">
+              <a:solidFill>
+                <a:schemeClr val="tx1"/>
+              </a:solidFill>
+              <a:latin typeface="+mn-lt"/>
+              <a:ea typeface="+mn-ea"/>
+              <a:cs typeface="+mn-cs"/>
+            </a:endParaRPr>
+          </a:p>
+          <a:p>
+            <a:r>
+              <a:rPr lang="ru-RU" sz="1200" kern="1200" dirty="0" smtClean="0">
+                <a:solidFill>
+                  <a:schemeClr val="tx1"/>
+                </a:solidFill>
+                <a:latin typeface="+mn-lt"/>
+                <a:ea typeface="+mn-ea"/>
+                <a:cs typeface="+mn-cs"/>
+              </a:rPr>
+              <a:t>В областях солнечного блика отражённая радиация составляет значительную часть регистрируемого излучения, что исключает возможность применения алгоритмов восстановления «цвета» Океана.</a:t>
+            </a:r>
+            <a:endParaRPr lang="en-US" sz="1200" kern="1200" dirty="0" smtClean="0">
+              <a:solidFill>
+                <a:schemeClr val="tx1"/>
+              </a:solidFill>
+              <a:latin typeface="+mn-lt"/>
+              <a:ea typeface="+mn-ea"/>
+              <a:cs typeface="+mn-cs"/>
+            </a:endParaRPr>
+          </a:p>
+          <a:p>
+            <a:r>
+              <a:rPr lang="ru-RU" sz="1200" kern="1200" dirty="0" smtClean="0">
+                <a:solidFill>
+                  <a:schemeClr val="tx1"/>
+                </a:solidFill>
+                <a:latin typeface="+mn-lt"/>
+                <a:ea typeface="+mn-ea"/>
+                <a:cs typeface="+mn-cs"/>
+              </a:rPr>
+              <a:t>Существование солнечного блика приводит к тому, что огромная часть спутниковых сканерных данных (до 30%) не может быть использована в классических океанографических приложениях.</a:t>
+            </a:r>
+            <a:endParaRPr lang="en-US" sz="1200" kern="1200" dirty="0" smtClean="0">
+              <a:solidFill>
+                <a:schemeClr val="tx1"/>
+              </a:solidFill>
+              <a:latin typeface="+mn-lt"/>
+              <a:ea typeface="+mn-ea"/>
+              <a:cs typeface="+mn-cs"/>
+            </a:endParaRPr>
+          </a:p>
+          <a:p>
+            <a:r>
+              <a:rPr lang="ru-RU" sz="1200" kern="1200" dirty="0" smtClean="0">
+                <a:solidFill>
+                  <a:schemeClr val="tx1"/>
+                </a:solidFill>
+                <a:latin typeface="+mn-lt"/>
+                <a:ea typeface="+mn-ea"/>
+                <a:cs typeface="+mn-cs"/>
+              </a:rPr>
+              <a:t>Области, где восстановление параметров цвета Океана по спутниковым данным невозможно, маскируются для конечного пользователя и, таким образом, «выбрасываются в мусорный ящик».</a:t>
+            </a:r>
+            <a:endParaRPr lang="en-US" sz="1200" kern="1200" dirty="0" smtClean="0">
+              <a:solidFill>
+                <a:schemeClr val="tx1"/>
+              </a:solidFill>
+              <a:latin typeface="+mn-lt"/>
+              <a:ea typeface="+mn-ea"/>
+              <a:cs typeface="+mn-cs"/>
+            </a:endParaRPr>
+          </a:p>
+          <a:p>
+            <a:endParaRPr lang="en-US" sz="1200" kern="1200" dirty="0" smtClean="0">
+              <a:solidFill>
+                <a:schemeClr val="tx1"/>
+              </a:solidFill>
+              <a:latin typeface="+mn-lt"/>
+              <a:ea typeface="+mn-ea"/>
+              <a:cs typeface="+mn-cs"/>
+            </a:endParaRPr>
+          </a:p>
+          <a:p>
+            <a:r>
+              <a:rPr lang="en-US" sz="1200" kern="1200" dirty="0" err="1" smtClean="0">
+                <a:solidFill>
+                  <a:schemeClr val="tx1"/>
+                </a:solidFill>
+                <a:latin typeface="+mn-lt"/>
+                <a:ea typeface="+mn-ea"/>
+                <a:cs typeface="+mn-cs"/>
+              </a:rPr>
+              <a:t>Для</a:t>
+            </a:r>
+            <a:r>
+              <a:rPr lang="en-US" sz="1200" kern="1200" dirty="0" smtClean="0">
+                <a:solidFill>
+                  <a:schemeClr val="tx1"/>
+                </a:solidFill>
+                <a:latin typeface="+mn-lt"/>
+                <a:ea typeface="+mn-ea"/>
+                <a:cs typeface="+mn-cs"/>
+              </a:rPr>
+              <a:t> </a:t>
+            </a:r>
+            <a:r>
+              <a:rPr lang="en-US" sz="1200" kern="1200" dirty="0" err="1" smtClean="0">
+                <a:solidFill>
+                  <a:schemeClr val="tx1"/>
+                </a:solidFill>
+                <a:latin typeface="+mn-lt"/>
+                <a:ea typeface="+mn-ea"/>
+                <a:cs typeface="+mn-cs"/>
+              </a:rPr>
+              <a:t>наглядности</a:t>
+            </a:r>
+            <a:r>
+              <a:rPr lang="en-US" sz="1200" kern="1200" baseline="0" dirty="0" smtClean="0">
+                <a:solidFill>
+                  <a:schemeClr val="tx1"/>
+                </a:solidFill>
+                <a:latin typeface="+mn-lt"/>
+                <a:ea typeface="+mn-ea"/>
+                <a:cs typeface="+mn-cs"/>
+              </a:rPr>
+              <a:t> </a:t>
+            </a:r>
+            <a:r>
+              <a:rPr lang="en-US" sz="1200" kern="1200" baseline="0" dirty="0" err="1" smtClean="0">
+                <a:solidFill>
+                  <a:schemeClr val="tx1"/>
+                </a:solidFill>
+                <a:latin typeface="+mn-lt"/>
+                <a:ea typeface="+mn-ea"/>
+                <a:cs typeface="+mn-cs"/>
+              </a:rPr>
+              <a:t>какое</a:t>
+            </a:r>
+            <a:r>
+              <a:rPr lang="en-US" sz="1200" kern="1200" baseline="0" dirty="0" smtClean="0">
+                <a:solidFill>
+                  <a:schemeClr val="tx1"/>
+                </a:solidFill>
+                <a:latin typeface="+mn-lt"/>
+                <a:ea typeface="+mn-ea"/>
+                <a:cs typeface="+mn-cs"/>
+              </a:rPr>
+              <a:t> </a:t>
+            </a:r>
+            <a:r>
+              <a:rPr lang="en-US" sz="1200" kern="1200" baseline="0" dirty="0" err="1" smtClean="0">
+                <a:solidFill>
+                  <a:schemeClr val="tx1"/>
+                </a:solidFill>
+                <a:latin typeface="+mn-lt"/>
+                <a:ea typeface="+mn-ea"/>
+                <a:cs typeface="+mn-cs"/>
+              </a:rPr>
+              <a:t>количество</a:t>
+            </a:r>
+            <a:r>
+              <a:rPr lang="en-US" sz="1200" kern="1200" baseline="0" dirty="0" smtClean="0">
+                <a:solidFill>
+                  <a:schemeClr val="tx1"/>
+                </a:solidFill>
+                <a:latin typeface="+mn-lt"/>
+                <a:ea typeface="+mn-ea"/>
+                <a:cs typeface="+mn-cs"/>
+              </a:rPr>
+              <a:t> </a:t>
+            </a:r>
+            <a:r>
+              <a:rPr lang="en-US" sz="1200" kern="1200" baseline="0" dirty="0" err="1" smtClean="0">
+                <a:solidFill>
+                  <a:schemeClr val="tx1"/>
+                </a:solidFill>
+                <a:latin typeface="+mn-lt"/>
+                <a:ea typeface="+mn-ea"/>
+                <a:cs typeface="+mn-cs"/>
+              </a:rPr>
+              <a:t>информации</a:t>
+            </a:r>
+            <a:r>
+              <a:rPr lang="en-US" sz="1200" kern="1200" baseline="0" dirty="0" smtClean="0">
+                <a:solidFill>
+                  <a:schemeClr val="tx1"/>
+                </a:solidFill>
+                <a:latin typeface="+mn-lt"/>
+                <a:ea typeface="+mn-ea"/>
+                <a:cs typeface="+mn-cs"/>
+              </a:rPr>
+              <a:t> “</a:t>
+            </a:r>
+            <a:r>
+              <a:rPr lang="en-US" sz="1200" kern="1200" baseline="0" dirty="0" err="1" smtClean="0">
+                <a:solidFill>
+                  <a:schemeClr val="tx1"/>
+                </a:solidFill>
+                <a:latin typeface="+mn-lt"/>
+                <a:ea typeface="+mn-ea"/>
+                <a:cs typeface="+mn-cs"/>
+              </a:rPr>
+              <a:t>выкидывается</a:t>
+            </a:r>
+            <a:r>
+              <a:rPr lang="en-US" sz="1200" kern="1200" baseline="0" dirty="0" smtClean="0">
+                <a:solidFill>
+                  <a:schemeClr val="tx1"/>
+                </a:solidFill>
+                <a:latin typeface="+mn-lt"/>
+                <a:ea typeface="+mn-ea"/>
+                <a:cs typeface="+mn-cs"/>
+              </a:rPr>
+              <a:t>” </a:t>
+            </a:r>
+            <a:r>
+              <a:rPr lang="en-US" sz="1200" kern="1200" baseline="0" dirty="0" err="1" smtClean="0">
+                <a:solidFill>
+                  <a:schemeClr val="tx1"/>
+                </a:solidFill>
+                <a:latin typeface="+mn-lt"/>
+                <a:ea typeface="+mn-ea"/>
+                <a:cs typeface="+mn-cs"/>
+              </a:rPr>
+              <a:t>приводится</a:t>
+            </a:r>
+            <a:r>
+              <a:rPr lang="en-US" sz="1200" kern="1200" baseline="0" dirty="0" smtClean="0">
+                <a:solidFill>
+                  <a:schemeClr val="tx1"/>
+                </a:solidFill>
+                <a:latin typeface="+mn-lt"/>
+                <a:ea typeface="+mn-ea"/>
+                <a:cs typeface="+mn-cs"/>
+              </a:rPr>
+              <a:t> </a:t>
+            </a:r>
+            <a:r>
+              <a:rPr lang="en-US" sz="1200" kern="1200" dirty="0" smtClean="0">
+                <a:solidFill>
+                  <a:schemeClr val="tx1"/>
+                </a:solidFill>
+                <a:latin typeface="+mn-lt"/>
+                <a:ea typeface="+mn-ea"/>
+                <a:cs typeface="+mn-cs"/>
+              </a:rPr>
+              <a:t>п</a:t>
+            </a:r>
+            <a:r>
+              <a:rPr lang="ru-RU" sz="1200" kern="1200" dirty="0" smtClean="0">
+                <a:solidFill>
+                  <a:schemeClr val="tx1"/>
+                </a:solidFill>
+                <a:latin typeface="+mn-lt"/>
+                <a:ea typeface="+mn-ea"/>
+                <a:cs typeface="+mn-cs"/>
+              </a:rPr>
+              <a:t>ример маскировки областей поверхности океана, «засвеченных» солнечным бликом в данных сканера MODIS</a:t>
+            </a:r>
+            <a:r>
+              <a:rPr lang="en-US" sz="1200" kern="1200" dirty="0" smtClean="0">
+                <a:solidFill>
+                  <a:schemeClr val="tx1"/>
+                </a:solidFill>
+                <a:latin typeface="+mn-lt"/>
+                <a:ea typeface="+mn-ea"/>
+                <a:cs typeface="+mn-cs"/>
+              </a:rPr>
+              <a:t>.</a:t>
+            </a:r>
+          </a:p>
+          <a:p>
+            <a:endParaRPr lang="en-US" dirty="0"/>
+          </a:p>
+        </p:txBody>
+      </p:sp>
+      <p:sp>
+        <p:nvSpPr>
+          <p:cNvPr id="4" name="Slide Number Placeholder 3"/>
+          <p:cNvSpPr>
+            <a:spLocks noGrp="1"/>
+          </p:cNvSpPr>
+          <p:nvPr>
+            <p:ph type="sldNum" sz="quarter" idx="10"/>
+          </p:nvPr>
+        </p:nvSpPr>
+        <p:spPr/>
+        <p:txBody>
+          <a:bodyPr/>
+          <a:lstStyle/>
+          <a:p>
+            <a:fld id="{F2832A28-FCE0-4BFA-8D7C-0EF8217108E6}" type="slidenum">
+              <a:rPr lang="en-US" smtClean="0"/>
+              <a:pPr/>
+              <a:t>2</a:t>
+            </a:fld>
+            <a:endParaRPr lang="en-US"/>
+          </a:p>
+        </p:txBody>
+      </p:sp>
+    </p:spTree>
+  </p:cSld>
+  <p:clrMapOvr>
+    <a:masterClrMapping/>
+  </p:clrMapOvr>
+</p:notes>
+</file>
+
+<file path=ppt/notesSlides/notesSlide2.xml><?xml version="1.0" encoding="utf-8"?>
+<p:notes xmlns:a="http://schemas.openxmlformats.org/drawingml/2006/main" xmlns:r="http://schemas.openxmlformats.org/officeDocument/2006/relationships" xmlns:p="http://schemas.openxmlformats.org/presentationml/2006/main">
+  <p:cSld>
+    <p:spTree>
+      <p:nvGrpSpPr>
+        <p:cNvPr id="1" name=""/>
+        <p:cNvGrpSpPr/>
+        <p:nvPr/>
+      </p:nvGrpSpPr>
+      <p:grpSpPr>
+        <a:xfrm>
+          <a:off x="0" y="0"/>
+          <a:ext cx="0" cy="0"/>
+          <a:chOff x="0" y="0"/>
+          <a:chExt cx="0" cy="0"/>
+        </a:xfrm>
+      </p:grpSpPr>
+      <p:sp>
+        <p:nvSpPr>
+          <p:cNvPr id="2" name="Slide Image Placeholder 1"/>
+          <p:cNvSpPr>
+            <a:spLocks noGrp="1" noRot="1" noChangeAspect="1"/>
+          </p:cNvSpPr>
+          <p:nvPr>
+            <p:ph type="sldImg"/>
+          </p:nvPr>
+        </p:nvSpPr>
+        <p:spPr/>
+      </p:sp>
+      <p:sp>
+        <p:nvSpPr>
+          <p:cNvPr id="3" name="Notes Placeholder 2"/>
+          <p:cNvSpPr>
+            <a:spLocks noGrp="1"/>
+          </p:cNvSpPr>
+          <p:nvPr>
+            <p:ph type="body" idx="1"/>
+          </p:nvPr>
+        </p:nvSpPr>
+        <p:spPr/>
+        <p:txBody>
+          <a:bodyPr>
+            <a:normAutofit fontScale="92500" lnSpcReduction="20000"/>
+          </a:bodyPr>
+          <a:lstStyle/>
+          <a:p>
+            <a:r>
+              <a:rPr lang="ru-RU" sz="1200" kern="1200" dirty="0" smtClean="0">
+                <a:solidFill>
+                  <a:schemeClr val="tx1"/>
+                </a:solidFill>
+                <a:latin typeface="+mn-lt"/>
+                <a:ea typeface="+mn-ea"/>
+                <a:cs typeface="+mn-cs"/>
+              </a:rPr>
+              <a:t>Основная идея</a:t>
+            </a:r>
+            <a:r>
+              <a:rPr lang="en-US" sz="1200" kern="1200" dirty="0" smtClean="0">
+                <a:solidFill>
+                  <a:schemeClr val="tx1"/>
+                </a:solidFill>
+                <a:latin typeface="+mn-lt"/>
+                <a:ea typeface="+mn-ea"/>
+                <a:cs typeface="+mn-cs"/>
+              </a:rPr>
+              <a:t> </a:t>
+            </a:r>
+            <a:r>
+              <a:rPr lang="ru-RU" sz="1200" kern="1200" noProof="0" dirty="0" smtClean="0">
+                <a:solidFill>
+                  <a:schemeClr val="tx1"/>
+                </a:solidFill>
+                <a:latin typeface="+mn-lt"/>
+                <a:ea typeface="+mn-ea"/>
+                <a:cs typeface="+mn-cs"/>
+              </a:rPr>
+              <a:t>работы</a:t>
+            </a:r>
+            <a:r>
+              <a:rPr lang="ru-RU" sz="1200" kern="1200" dirty="0" smtClean="0">
+                <a:solidFill>
+                  <a:schemeClr val="tx1"/>
+                </a:solidFill>
+                <a:latin typeface="+mn-lt"/>
+                <a:ea typeface="+mn-ea"/>
+                <a:cs typeface="+mn-cs"/>
+              </a:rPr>
+              <a:t> состоит в том, что отраженная солнечная радиация несёт информацию о характеристиках «шероховатости» поверхности Океана.</a:t>
+            </a:r>
+            <a:endParaRPr lang="en-US" sz="1200" kern="1200" dirty="0" smtClean="0">
+              <a:solidFill>
+                <a:schemeClr val="tx1"/>
+              </a:solidFill>
+              <a:latin typeface="+mn-lt"/>
+              <a:ea typeface="+mn-ea"/>
+              <a:cs typeface="+mn-cs"/>
+            </a:endParaRPr>
+          </a:p>
+          <a:p>
+            <a:endParaRPr lang="en-US" sz="1200" kern="1200" dirty="0" smtClean="0">
+              <a:solidFill>
+                <a:schemeClr val="tx1"/>
+              </a:solidFill>
+              <a:latin typeface="+mn-lt"/>
+              <a:ea typeface="+mn-ea"/>
+              <a:cs typeface="+mn-cs"/>
+            </a:endParaRPr>
+          </a:p>
+          <a:p>
+            <a:r>
+              <a:rPr lang="ru-RU" sz="1200" kern="1200" dirty="0" smtClean="0">
+                <a:solidFill>
+                  <a:schemeClr val="tx1"/>
+                </a:solidFill>
+                <a:latin typeface="+mn-lt"/>
+                <a:ea typeface="+mn-ea"/>
+                <a:cs typeface="+mn-cs"/>
+              </a:rPr>
+              <a:t>В этом случае данные оптических сканеров могут быть использованы для исследования статистических характеристик ветрового волнения и их вариаций, вызванных различными океаническими процессами.</a:t>
+            </a:r>
+            <a:endParaRPr lang="en-US" sz="1200" kern="1200" dirty="0" smtClean="0">
+              <a:solidFill>
+                <a:schemeClr val="tx1"/>
+              </a:solidFill>
+              <a:latin typeface="+mn-lt"/>
+              <a:ea typeface="+mn-ea"/>
+              <a:cs typeface="+mn-cs"/>
+            </a:endParaRPr>
+          </a:p>
+          <a:p>
+            <a:endParaRPr lang="en-US" sz="1200" kern="1200" dirty="0" smtClean="0">
+              <a:solidFill>
+                <a:schemeClr val="tx1"/>
+              </a:solidFill>
+              <a:latin typeface="+mn-lt"/>
+              <a:ea typeface="+mn-ea"/>
+              <a:cs typeface="+mn-cs"/>
+            </a:endParaRPr>
+          </a:p>
+          <a:p>
+            <a:r>
+              <a:rPr lang="ru-RU" sz="1200" kern="1200" dirty="0" smtClean="0">
+                <a:solidFill>
+                  <a:schemeClr val="tx1"/>
+                </a:solidFill>
+                <a:latin typeface="+mn-lt"/>
+                <a:ea typeface="+mn-ea"/>
+                <a:cs typeface="+mn-cs"/>
+              </a:rPr>
+              <a:t>Актуальность данного исследования определяется так же необходимостью разработки нового метода, позволяющего использовать отбрасываемые ранее данные оптических сканеров для исследования проявления различных динамических процессов на поверхности Океана.</a:t>
+            </a:r>
+            <a:endParaRPr lang="en-US" sz="1200" kern="1200" dirty="0" smtClean="0">
+              <a:solidFill>
+                <a:schemeClr val="tx1"/>
+              </a:solidFill>
+              <a:latin typeface="+mn-lt"/>
+              <a:ea typeface="+mn-ea"/>
+              <a:cs typeface="+mn-cs"/>
+            </a:endParaRPr>
+          </a:p>
+          <a:p>
+            <a:endParaRPr lang="en-US" sz="1200" kern="1200" dirty="0" smtClean="0">
+              <a:solidFill>
+                <a:schemeClr val="tx1"/>
+              </a:solidFill>
+              <a:latin typeface="+mn-lt"/>
+              <a:ea typeface="+mn-ea"/>
+              <a:cs typeface="+mn-cs"/>
+            </a:endParaRPr>
+          </a:p>
+          <a:p>
+            <a:r>
+              <a:rPr lang="ru-RU" sz="1200" kern="1200" dirty="0" smtClean="0">
+                <a:solidFill>
+                  <a:schemeClr val="tx1"/>
+                </a:solidFill>
+                <a:latin typeface="+mn-lt"/>
+                <a:ea typeface="+mn-ea"/>
+                <a:cs typeface="+mn-cs"/>
+              </a:rPr>
+              <a:t>Предлагаемый подход, совместно с существующими радиолокационными (РЛ) методами наблюдения поверхности Океана, открывает новые возможности для мониторинга океанических явлений из Космоса по их поверхностным проявлениям.</a:t>
+            </a:r>
+            <a:endParaRPr lang="en-US" dirty="0"/>
+          </a:p>
+        </p:txBody>
+      </p:sp>
+      <p:sp>
+        <p:nvSpPr>
+          <p:cNvPr id="4" name="Slide Number Placeholder 3"/>
+          <p:cNvSpPr>
+            <a:spLocks noGrp="1"/>
+          </p:cNvSpPr>
+          <p:nvPr>
+            <p:ph type="sldNum" sz="quarter" idx="10"/>
+          </p:nvPr>
+        </p:nvSpPr>
+        <p:spPr/>
+        <p:txBody>
+          <a:bodyPr/>
+          <a:lstStyle/>
+          <a:p>
+            <a:fld id="{F2832A28-FCE0-4BFA-8D7C-0EF8217108E6}" type="slidenum">
+              <a:rPr lang="en-US" smtClean="0"/>
+              <a:pPr/>
+              <a:t>4</a:t>
+            </a:fld>
+            <a:endParaRPr lang="en-US"/>
+          </a:p>
+        </p:txBody>
+      </p:sp>
+    </p:spTree>
+  </p:cSld>
+  <p:clrMapOvr>
+    <a:masterClrMapping/>
+  </p:clrMapOvr>
+</p:notes>
+</file>
+
+<file path=ppt/notesSlides/notesSlide3.xml><?xml version="1.0" encoding="utf-8"?>
+<p:notes xmlns:a="http://schemas.openxmlformats.org/drawingml/2006/main" xmlns:r="http://schemas.openxmlformats.org/officeDocument/2006/relationships" xmlns:p="http://schemas.openxmlformats.org/presentationml/2006/main">
+  <p:cSld>
+    <p:spTree>
+      <p:nvGrpSpPr>
+        <p:cNvPr id="1" name=""/>
+        <p:cNvGrpSpPr/>
+        <p:nvPr/>
+      </p:nvGrpSpPr>
+      <p:grpSpPr>
+        <a:xfrm>
+          <a:off x="0" y="0"/>
+          <a:ext cx="0" cy="0"/>
+          <a:chOff x="0" y="0"/>
+          <a:chExt cx="0" cy="0"/>
+        </a:xfrm>
+      </p:grpSpPr>
+      <p:sp>
+        <p:nvSpPr>
+          <p:cNvPr id="2" name="Slide Image Placeholder 1"/>
+          <p:cNvSpPr>
+            <a:spLocks noGrp="1" noRot="1" noChangeAspect="1"/>
+          </p:cNvSpPr>
+          <p:nvPr>
+            <p:ph type="sldImg"/>
+          </p:nvPr>
+        </p:nvSpPr>
+        <p:spPr/>
+      </p:sp>
+      <p:sp>
+        <p:nvSpPr>
+          <p:cNvPr id="3" name="Notes Placeholder 2"/>
+          <p:cNvSpPr>
+            <a:spLocks noGrp="1"/>
+          </p:cNvSpPr>
+          <p:nvPr>
+            <p:ph type="body" idx="1"/>
+          </p:nvPr>
+        </p:nvSpPr>
+        <p:spPr/>
+        <p:txBody>
+          <a:bodyPr>
+            <a:normAutofit/>
+          </a:bodyPr>
+          <a:lstStyle/>
+          <a:p>
+            <a:r>
+              <a:rPr lang="en-US" dirty="0" err="1" smtClean="0"/>
+              <a:t>Цель</a:t>
+            </a:r>
+            <a:r>
+              <a:rPr lang="en-US" baseline="0" dirty="0" smtClean="0"/>
+              <a:t> </a:t>
+            </a:r>
+            <a:r>
+              <a:rPr lang="en-US" baseline="0" dirty="0" err="1" smtClean="0"/>
+              <a:t>исследования</a:t>
+            </a:r>
+            <a:r>
+              <a:rPr lang="en-US" baseline="0" dirty="0" smtClean="0"/>
+              <a:t> </a:t>
+            </a:r>
+            <a:r>
+              <a:rPr lang="en-US" baseline="0" dirty="0" err="1" smtClean="0"/>
+              <a:t>разбита</a:t>
+            </a:r>
+            <a:r>
+              <a:rPr lang="en-US" baseline="0" dirty="0" smtClean="0"/>
+              <a:t> </a:t>
+            </a:r>
+            <a:r>
+              <a:rPr lang="en-US" baseline="0" dirty="0" err="1" smtClean="0"/>
+              <a:t>на</a:t>
+            </a:r>
+            <a:r>
+              <a:rPr lang="en-US" baseline="0" dirty="0" smtClean="0"/>
+              <a:t> 2 </a:t>
+            </a:r>
+            <a:r>
+              <a:rPr lang="en-US" baseline="0" dirty="0" err="1" smtClean="0"/>
+              <a:t>составляющих</a:t>
+            </a:r>
+            <a:r>
+              <a:rPr lang="en-US" baseline="0" dirty="0" smtClean="0"/>
+              <a:t/>
+            </a:r>
+            <a:br>
+              <a:rPr lang="en-US" baseline="0" dirty="0" smtClean="0"/>
+            </a:br>
+            <a:r>
+              <a:rPr lang="en-US" baseline="0" dirty="0" smtClean="0"/>
+              <a:t/>
+            </a:r>
+            <a:br>
+              <a:rPr lang="en-US" baseline="0" dirty="0" smtClean="0"/>
+            </a:br>
+            <a:r>
+              <a:rPr lang="en-US" baseline="0" dirty="0" smtClean="0"/>
+              <a:t>В </a:t>
+            </a:r>
+            <a:r>
+              <a:rPr lang="en-US" baseline="0" dirty="0" err="1" smtClean="0"/>
+              <a:t>первую</a:t>
+            </a:r>
+            <a:r>
+              <a:rPr lang="en-US" baseline="0" dirty="0" smtClean="0"/>
+              <a:t> </a:t>
+            </a:r>
+            <a:r>
+              <a:rPr lang="en-US" baseline="0" dirty="0" err="1" smtClean="0"/>
+              <a:t>очередь</a:t>
+            </a:r>
+            <a:r>
+              <a:rPr lang="en-US" baseline="0" dirty="0" smtClean="0"/>
+              <a:t> </a:t>
+            </a:r>
+            <a:r>
+              <a:rPr lang="en-US" baseline="0" dirty="0" err="1" smtClean="0"/>
+              <a:t>необходимо</a:t>
+            </a:r>
+            <a:r>
+              <a:rPr lang="en-US" baseline="0" dirty="0" smtClean="0"/>
+              <a:t> </a:t>
+            </a:r>
+            <a:r>
+              <a:rPr lang="en-US" baseline="0" dirty="0" err="1" smtClean="0"/>
+              <a:t>создать</a:t>
+            </a:r>
+            <a:r>
+              <a:rPr lang="en-US" baseline="0" dirty="0" smtClean="0"/>
+              <a:t> </a:t>
+            </a:r>
+            <a:r>
+              <a:rPr lang="ru-RU" dirty="0" smtClean="0"/>
+              <a:t>метод исследования поверхности Океана по спутниковым изображениям солнечного блика</a:t>
+            </a:r>
+            <a:endParaRPr lang="en-US" dirty="0" smtClean="0"/>
+          </a:p>
+          <a:p>
+            <a:endParaRPr lang="en-US" dirty="0" smtClean="0"/>
+          </a:p>
+          <a:p>
+            <a:r>
+              <a:rPr lang="en-US" dirty="0" smtClean="0"/>
+              <a:t>И </a:t>
+            </a:r>
+            <a:r>
+              <a:rPr lang="en-US" dirty="0" err="1" smtClean="0"/>
+              <a:t>во</a:t>
+            </a:r>
+            <a:r>
+              <a:rPr lang="en-US" dirty="0" smtClean="0"/>
+              <a:t> </a:t>
+            </a:r>
+            <a:r>
+              <a:rPr lang="en-US" dirty="0" err="1" smtClean="0"/>
+              <a:t>вторую</a:t>
+            </a:r>
+            <a:r>
+              <a:rPr lang="en-US" baseline="0" dirty="0" smtClean="0"/>
+              <a:t> – </a:t>
+            </a:r>
+            <a:r>
+              <a:rPr lang="en-US" baseline="0" dirty="0" err="1" smtClean="0"/>
+              <a:t>применить</a:t>
+            </a:r>
+            <a:r>
+              <a:rPr lang="en-US" baseline="0" dirty="0" smtClean="0"/>
+              <a:t> </a:t>
+            </a:r>
+            <a:r>
+              <a:rPr lang="ru-RU" dirty="0" smtClean="0"/>
+              <a:t>это</a:t>
+            </a:r>
+            <a:r>
+              <a:rPr lang="en-US" dirty="0" smtClean="0"/>
+              <a:t>т</a:t>
+            </a:r>
+            <a:r>
+              <a:rPr lang="en-US" baseline="0" dirty="0" smtClean="0"/>
+              <a:t> </a:t>
+            </a:r>
+            <a:r>
+              <a:rPr lang="ru-RU" dirty="0" smtClean="0"/>
+              <a:t>метод для исследования нефтяных загрязнений и поверхностных проявлений динамических процессов в Океане</a:t>
+            </a:r>
+            <a:endParaRPr lang="en-US" dirty="0"/>
+          </a:p>
+        </p:txBody>
+      </p:sp>
+      <p:sp>
+        <p:nvSpPr>
+          <p:cNvPr id="4" name="Slide Number Placeholder 3"/>
+          <p:cNvSpPr>
+            <a:spLocks noGrp="1"/>
+          </p:cNvSpPr>
+          <p:nvPr>
+            <p:ph type="sldNum" sz="quarter" idx="10"/>
+          </p:nvPr>
+        </p:nvSpPr>
+        <p:spPr/>
+        <p:txBody>
+          <a:bodyPr/>
+          <a:lstStyle/>
+          <a:p>
+            <a:fld id="{F2832A28-FCE0-4BFA-8D7C-0EF8217108E6}" type="slidenum">
+              <a:rPr lang="en-US" smtClean="0"/>
+              <a:pPr/>
+              <a:t>5</a:t>
+            </a:fld>
+            <a:endParaRPr lang="en-US"/>
+          </a:p>
+        </p:txBody>
+      </p:sp>
+    </p:spTree>
+  </p:cSld>
+  <p:clrMapOvr>
+    <a:masterClrMapping/>
+  </p:clrMapOvr>
+</p:notes>
+</file>
+
+<file path=ppt/notesSlides/notesSlide4.xml><?xml version="1.0" encoding="utf-8"?>
+<p:notes xmlns:a="http://schemas.openxmlformats.org/drawingml/2006/main" xmlns:r="http://schemas.openxmlformats.org/officeDocument/2006/relationships" xmlns:p="http://schemas.openxmlformats.org/presentationml/2006/main">
+  <p:cSld>
+    <p:spTree>
+      <p:nvGrpSpPr>
+        <p:cNvPr id="1" name=""/>
+        <p:cNvGrpSpPr/>
+        <p:nvPr/>
+      </p:nvGrpSpPr>
+      <p:grpSpPr>
+        <a:xfrm>
+          <a:off x="0" y="0"/>
+          <a:ext cx="0" cy="0"/>
+          <a:chOff x="0" y="0"/>
+          <a:chExt cx="0" cy="0"/>
+        </a:xfrm>
+      </p:grpSpPr>
+      <p:sp>
+        <p:nvSpPr>
+          <p:cNvPr id="2" name="Slide Image Placeholder 1"/>
+          <p:cNvSpPr>
+            <a:spLocks noGrp="1" noRot="1" noChangeAspect="1"/>
+          </p:cNvSpPr>
+          <p:nvPr>
+            <p:ph type="sldImg"/>
+          </p:nvPr>
+        </p:nvSpPr>
+        <p:spPr/>
+      </p:sp>
+      <p:sp>
+        <p:nvSpPr>
+          <p:cNvPr id="3" name="Notes Placeholder 2"/>
+          <p:cNvSpPr>
+            <a:spLocks noGrp="1"/>
+          </p:cNvSpPr>
+          <p:nvPr>
+            <p:ph type="body" idx="1"/>
+          </p:nvPr>
+        </p:nvSpPr>
+        <p:spPr/>
+        <p:txBody>
+          <a:bodyPr>
+            <a:normAutofit/>
+          </a:bodyPr>
+          <a:lstStyle/>
+          <a:p>
+            <a:r>
+              <a:rPr lang="en-US" dirty="0" err="1" smtClean="0"/>
+              <a:t>Чтобы</a:t>
+            </a:r>
+            <a:r>
+              <a:rPr lang="en-US" dirty="0" smtClean="0"/>
+              <a:t> </a:t>
+            </a:r>
+            <a:r>
+              <a:rPr lang="en-US" dirty="0" err="1" smtClean="0"/>
+              <a:t>достичь</a:t>
+            </a:r>
+            <a:r>
+              <a:rPr lang="en-US" dirty="0" smtClean="0"/>
+              <a:t> </a:t>
+            </a:r>
+            <a:r>
+              <a:rPr lang="en-US" dirty="0" err="1" smtClean="0"/>
+              <a:t>поставленной</a:t>
+            </a:r>
+            <a:r>
+              <a:rPr lang="en-US" baseline="0" dirty="0" smtClean="0"/>
+              <a:t> </a:t>
+            </a:r>
+            <a:r>
+              <a:rPr lang="en-US" baseline="0" dirty="0" err="1" smtClean="0"/>
+              <a:t>цели</a:t>
+            </a:r>
+            <a:r>
+              <a:rPr lang="en-US" baseline="0" dirty="0" smtClean="0"/>
+              <a:t> </a:t>
+            </a:r>
+            <a:r>
+              <a:rPr lang="en-US" dirty="0" err="1" smtClean="0"/>
+              <a:t>решались</a:t>
+            </a:r>
+            <a:r>
+              <a:rPr lang="en-US" baseline="0" dirty="0" smtClean="0"/>
+              <a:t> </a:t>
+            </a:r>
+            <a:r>
+              <a:rPr lang="en-US" baseline="0" dirty="0" err="1" smtClean="0"/>
+              <a:t>следующие</a:t>
+            </a:r>
+            <a:r>
+              <a:rPr lang="en-US" baseline="0" dirty="0" smtClean="0"/>
+              <a:t> </a:t>
+            </a:r>
+            <a:r>
+              <a:rPr lang="en-US" baseline="0" dirty="0" err="1" smtClean="0"/>
+              <a:t>задачи</a:t>
+            </a:r>
+            <a:r>
+              <a:rPr lang="en-US" baseline="0" dirty="0" smtClean="0"/>
+              <a:t>:</a:t>
+            </a:r>
+            <a:endParaRPr lang="en-US" dirty="0"/>
+          </a:p>
+        </p:txBody>
+      </p:sp>
+      <p:sp>
+        <p:nvSpPr>
+          <p:cNvPr id="4" name="Slide Number Placeholder 3"/>
+          <p:cNvSpPr>
+            <a:spLocks noGrp="1"/>
+          </p:cNvSpPr>
+          <p:nvPr>
+            <p:ph type="sldNum" sz="quarter" idx="10"/>
+          </p:nvPr>
+        </p:nvSpPr>
+        <p:spPr/>
+        <p:txBody>
+          <a:bodyPr/>
+          <a:lstStyle/>
+          <a:p>
+            <a:fld id="{F2832A28-FCE0-4BFA-8D7C-0EF8217108E6}" type="slidenum">
+              <a:rPr lang="en-US" smtClean="0"/>
+              <a:pPr/>
+              <a:t>6</a:t>
+            </a:fld>
+            <a:endParaRPr lang="en-US"/>
+          </a:p>
+        </p:txBody>
+      </p:sp>
+    </p:spTree>
+  </p:cSld>
+  <p:clrMapOvr>
+    <a:masterClrMapping/>
+  </p:clrMapOvr>
+</p:notes>
+</file>
+
+<file path=ppt/notesSlides/notesSlide5.xml><?xml version="1.0" encoding="utf-8"?>
+<p:notes xmlns:a="http://schemas.openxmlformats.org/drawingml/2006/main" xmlns:r="http://schemas.openxmlformats.org/officeDocument/2006/relationships" xmlns:p="http://schemas.openxmlformats.org/presentationml/2006/main">
+  <p:cSld>
+    <p:spTree>
+      <p:nvGrpSpPr>
+        <p:cNvPr id="1" name=""/>
+        <p:cNvGrpSpPr/>
+        <p:nvPr/>
+      </p:nvGrpSpPr>
+      <p:grpSpPr>
+        <a:xfrm>
+          <a:off x="0" y="0"/>
+          <a:ext cx="0" cy="0"/>
+          <a:chOff x="0" y="0"/>
+          <a:chExt cx="0" cy="0"/>
+        </a:xfrm>
+      </p:grpSpPr>
+      <p:sp>
+        <p:nvSpPr>
+          <p:cNvPr id="2" name="Slide Image Placeholder 1"/>
+          <p:cNvSpPr>
+            <a:spLocks noGrp="1" noRot="1" noChangeAspect="1"/>
+          </p:cNvSpPr>
+          <p:nvPr>
+            <p:ph type="sldImg"/>
+          </p:nvPr>
+        </p:nvSpPr>
+        <p:spPr/>
+      </p:sp>
+      <p:sp>
+        <p:nvSpPr>
+          <p:cNvPr id="3" name="Notes Placeholder 2"/>
+          <p:cNvSpPr>
+            <a:spLocks noGrp="1"/>
+          </p:cNvSpPr>
+          <p:nvPr>
+            <p:ph type="body" idx="1"/>
+          </p:nvPr>
+        </p:nvSpPr>
+        <p:spPr/>
+        <p:txBody>
+          <a:bodyPr>
+            <a:normAutofit/>
+          </a:bodyPr>
+          <a:lstStyle/>
+          <a:p>
+            <a:pPr marL="514350" indent="-514350">
+              <a:buFont typeface="+mj-lt"/>
+              <a:buAutoNum type="romanUcPeriod"/>
+            </a:pPr>
+            <a:r>
+              <a:rPr lang="ru-RU" dirty="0" smtClean="0"/>
+              <a:t>разработанный метод диагностики пространственных аномалий «шероховатости» поверхности Океана по спутниковым изображениям солнечного блика позволяет работать с различными оптическими спектрометрами благодаря использованию передаточной функции, которая напрямую зависит от наблюдаемых градиентов яркости солнечного блика, бе априорного задания плотности распределения уклонов;</a:t>
+            </a:r>
+          </a:p>
+          <a:p>
+            <a:pPr marL="514350" indent="-514350">
+              <a:buFont typeface="+mj-lt"/>
+              <a:buAutoNum type="romanUcPeriod"/>
+            </a:pPr>
+            <a:r>
+              <a:rPr lang="ru-RU" dirty="0" smtClean="0"/>
+              <a:t>контрасты СКН в нефтяных сликах ситематически ниже контрастов СКН в сликах биологического происхождения;</a:t>
+            </a:r>
+          </a:p>
+          <a:p>
+            <a:pPr marL="514350" indent="-514350">
+              <a:buFont typeface="+mj-lt"/>
+              <a:buAutoNum type="romanUcPeriod"/>
+            </a:pPr>
+            <a:r>
+              <a:rPr lang="ru-RU" dirty="0" smtClean="0"/>
+              <a:t>для одного и того же слика, сформированного тонкой нефтяной плёнкой, контрасты УЭПР примерно в 1.6 раза сильнее контрастов СКН;</a:t>
+            </a:r>
+          </a:p>
+          <a:p>
+            <a:pPr marL="514350" indent="-514350">
+              <a:buFont typeface="+mj-lt"/>
+              <a:buAutoNum type="romanUcPeriod"/>
+            </a:pPr>
+            <a:r>
+              <a:rPr lang="ru-RU" dirty="0" smtClean="0"/>
+              <a:t>поверхностные проявления ВВ и мезомасштабных течений отчётливо проявляются в модуляциях уклонов морской поверхности в результате усиления среднеквадратичного наклона (СКН) в зонах конвергенции течения, и его подавления в зонах дивергенции;</a:t>
+            </a:r>
+          </a:p>
+          <a:p>
+            <a:pPr marL="514350" indent="-514350">
+              <a:buFont typeface="+mj-lt"/>
+              <a:buAutoNum type="romanUcPeriod"/>
+            </a:pPr>
+            <a:r>
+              <a:rPr lang="ru-RU" dirty="0" smtClean="0"/>
+              <a:t>аномалии характеристик ветрового волнения (СКН, обрушения) связаны с зонами дивергенции течений и пространственно привязаны к областям сильных градиентов завихренности полей квази-геострофических течений.</a:t>
+            </a:r>
+          </a:p>
+        </p:txBody>
+      </p:sp>
+      <p:sp>
+        <p:nvSpPr>
+          <p:cNvPr id="4" name="Slide Number Placeholder 3"/>
+          <p:cNvSpPr>
+            <a:spLocks noGrp="1"/>
+          </p:cNvSpPr>
+          <p:nvPr>
+            <p:ph type="sldNum" sz="quarter" idx="10"/>
+          </p:nvPr>
+        </p:nvSpPr>
+        <p:spPr/>
+        <p:txBody>
+          <a:bodyPr/>
+          <a:lstStyle/>
+          <a:p>
+            <a:fld id="{F2832A28-FCE0-4BFA-8D7C-0EF8217108E6}" type="slidenum">
+              <a:rPr lang="en-US" smtClean="0"/>
+              <a:pPr/>
+              <a:t>7</a:t>
+            </a:fld>
+            <a:endParaRPr lang="en-US"/>
+          </a:p>
+        </p:txBody>
+      </p:sp>
+    </p:spTree>
+  </p:cSld>
+  <p:clrMapOvr>
+    <a:masterClrMapping/>
+  </p:clrMapOvr>
+</p:notes>
 </file>
 
 <file path=ppt/slideLayouts/slideLayout1.xml><?xml version="1.0" encoding="utf-8"?>
@@ -2300,7 +3685,7 @@
             <a:fld id="{B4C71EC6-210F-42DE-9C53-41977AD35B3D}" type="datetimeFigureOut">
               <a:rPr lang="ru-RU" smtClean="0"/>
               <a:pPr/>
-              <a:t>20.03.2014</a:t>
+              <a:t>31.03.2014</a:t>
             </a:fld>
             <a:endParaRPr lang="ru-RU"/>
           </a:p>
@@ -2483,7 +3868,7 @@
             <a:fld id="{B4C71EC6-210F-42DE-9C53-41977AD35B3D}" type="datetimeFigureOut">
               <a:rPr lang="ru-RU" smtClean="0"/>
               <a:pPr/>
-              <a:t>20.03.2014</a:t>
+              <a:t>31.03.2014</a:t>
             </a:fld>
             <a:endParaRPr lang="ru-RU"/>
           </a:p>
@@ -2636,7 +4021,7 @@
             <a:fld id="{B4C71EC6-210F-42DE-9C53-41977AD35B3D}" type="datetimeFigureOut">
               <a:rPr lang="ru-RU" smtClean="0"/>
               <a:pPr/>
-              <a:t>20.03.2014</a:t>
+              <a:t>31.03.2014</a:t>
             </a:fld>
             <a:endParaRPr lang="ru-RU"/>
           </a:p>
@@ -4464,7 +5849,7 @@
             <a:fld id="{B4C71EC6-210F-42DE-9C53-41977AD35B3D}" type="datetimeFigureOut">
               <a:rPr lang="ru-RU" smtClean="0"/>
               <a:pPr/>
-              <a:t>20.03.2014</a:t>
+              <a:t>31.03.2014</a:t>
             </a:fld>
             <a:endParaRPr lang="ru-RU"/>
           </a:p>
@@ -6336,7 +7721,7 @@
             <a:fld id="{B4C71EC6-210F-42DE-9C53-41977AD35B3D}" type="datetimeFigureOut">
               <a:rPr lang="ru-RU" smtClean="0"/>
               <a:pPr/>
-              <a:t>20.03.2014</a:t>
+              <a:t>31.03.2014</a:t>
             </a:fld>
             <a:endParaRPr lang="ru-RU"/>
           </a:p>
@@ -6451,7 +7836,7 @@
             <a:fld id="{B4C71EC6-210F-42DE-9C53-41977AD35B3D}" type="datetimeFigureOut">
               <a:rPr lang="ru-RU" smtClean="0"/>
               <a:pPr/>
-              <a:t>20.03.2014</a:t>
+              <a:t>31.03.2014</a:t>
             </a:fld>
             <a:endParaRPr lang="ru-RU"/>
           </a:p>
@@ -6994,7 +8379,7 @@
             <a:fld id="{B4C71EC6-210F-42DE-9C53-41977AD35B3D}" type="datetimeFigureOut">
               <a:rPr lang="ru-RU" smtClean="0"/>
               <a:pPr/>
-              <a:t>20.03.2014</a:t>
+              <a:t>31.03.2014</a:t>
             </a:fld>
             <a:endParaRPr lang="ru-RU"/>
           </a:p>
@@ -7109,7 +8494,7 @@
             <a:fld id="{B4C71EC6-210F-42DE-9C53-41977AD35B3D}" type="datetimeFigureOut">
               <a:rPr lang="ru-RU" smtClean="0"/>
               <a:pPr/>
-              <a:t>20.03.2014</a:t>
+              <a:t>31.03.2014</a:t>
             </a:fld>
             <a:endParaRPr lang="ru-RU"/>
           </a:p>
@@ -8822,7 +10207,7 @@
             <a:fld id="{B4C71EC6-210F-42DE-9C53-41977AD35B3D}" type="datetimeFigureOut">
               <a:rPr lang="ru-RU" smtClean="0"/>
               <a:pPr/>
-              <a:t>20.03.2014</a:t>
+              <a:t>31.03.2014</a:t>
             </a:fld>
             <a:endParaRPr lang="ru-RU"/>
           </a:p>
@@ -8975,7 +10360,7 @@
             <a:fld id="{B4C71EC6-210F-42DE-9C53-41977AD35B3D}" type="datetimeFigureOut">
               <a:rPr lang="ru-RU" smtClean="0"/>
               <a:pPr/>
-              <a:t>20.03.2014</a:t>
+              <a:t>31.03.2014</a:t>
             </a:fld>
             <a:endParaRPr lang="ru-RU"/>
           </a:p>
@@ -12592,7 +13977,7 @@
             <a:fld id="{B4C71EC6-210F-42DE-9C53-41977AD35B3D}" type="datetimeFigureOut">
               <a:rPr lang="ru-RU" smtClean="0"/>
               <a:pPr/>
-              <a:t>20.03.2014</a:t>
+              <a:t>31.03.2014</a:t>
             </a:fld>
             <a:endParaRPr lang="ru-RU"/>
           </a:p>
@@ -14453,7 +15838,7 @@
             <a:fld id="{B4C71EC6-210F-42DE-9C53-41977AD35B3D}" type="datetimeFigureOut">
               <a:rPr lang="ru-RU" smtClean="0"/>
               <a:pPr/>
-              <a:t>20.03.2014</a:t>
+              <a:t>31.03.2014</a:t>
             </a:fld>
             <a:endParaRPr lang="ru-RU"/>
           </a:p>
@@ -15002,11 +16387,7 @@
             </a:r>
             <a:r>
               <a:rPr lang="ru-RU" sz="2400" b="1" dirty="0" smtClean="0"/>
-              <a:t>ный </a:t>
-            </a:r>
-            <a:r>
-              <a:rPr lang="ru-RU" sz="2400" b="1" dirty="0" smtClean="0"/>
-              <a:t>блик</a:t>
+              <a:t>ный блик</a:t>
             </a:r>
             <a:r>
               <a:rPr lang="en-US" sz="2400" b="1" dirty="0" smtClean="0"/>
@@ -15327,7 +16708,7 @@
         <p:spPr>
           <a:xfrm>
             <a:off x="3191751" y="6093296"/>
-            <a:ext cx="2792752" cy="400110"/>
+            <a:ext cx="3453189" cy="400110"/>
           </a:xfrm>
           <a:prstGeom prst="rect">
             <a:avLst/>
@@ -15344,6 +16725,10 @@
               <a:t>Санкт-Петербург – </a:t>
             </a:r>
             <a:r>
+              <a:rPr lang="en-US" sz="2000" dirty="0" smtClean="0"/>
+              <a:t>24.04.</a:t>
+            </a:r>
+            <a:r>
               <a:rPr lang="ru-RU" sz="2000" dirty="0" smtClean="0"/>
               <a:t>201</a:t>
             </a:r>
@@ -15358,13 +16743,16 @@
     </p:spTree>
     <p:extLst>
       <p:ext uri="{BB962C8B-B14F-4D97-AF65-F5344CB8AC3E}">
-        <p14:creationId xmlns="" xmlns:p14="http://schemas.microsoft.com/office/powerpoint/2010/main" val="3764964236"/>
+        <p14:creationId xmlns:p14="http://schemas.microsoft.com/office/powerpoint/2010/main" xmlns="" val="3764964236"/>
       </p:ext>
     </p:extLst>
   </p:cSld>
   <p:clrMapOvr>
     <a:masterClrMapping/>
   </p:clrMapOvr>
+  <p:transition>
+    <p:fade/>
+  </p:transition>
   <p:timing>
     <p:tnLst>
       <p:par>
@@ -15415,8 +16803,8 @@
           <a:lstStyle/>
           <a:p>
             <a:r>
-              <a:rPr lang="ru-RU" sz="4000" dirty="0" smtClean="0"/>
-              <a:t>Благодарности</a:t>
+              <a:rPr lang="ru-RU" sz="4000" dirty="0"/>
+              <a:t>Апробация работы и публикации</a:t>
             </a:r>
             <a:endParaRPr lang="en-US" sz="4000" dirty="0"/>
           </a:p>
@@ -15434,30 +16822,288 @@
         </p:nvSpPr>
         <p:spPr>
           <a:xfrm>
-            <a:off x="224644" y="1451917"/>
-            <a:ext cx="8694712" cy="4929411"/>
+            <a:off x="224644" y="1556793"/>
+            <a:ext cx="8694712" cy="5184576"/>
           </a:xfrm>
         </p:spPr>
         <p:txBody>
           <a:bodyPr>
-            <a:normAutofit/>
+            <a:noAutofit/>
           </a:bodyPr>
           <a:lstStyle/>
           <a:p>
-            <a:endParaRPr lang="en-US" dirty="0"/>
+            <a:r>
+              <a:rPr lang="ru-RU" sz="1400" b="1" dirty="0"/>
+              <a:t>Предложенная методика была апробирована на различных конференциях и семинарах</a:t>
+            </a:r>
+            <a:r>
+              <a:rPr lang="ru-RU" sz="1400" dirty="0"/>
+              <a:t>, а результаты исследований представлены к публикации в научных журналах, входящих в перечень изданий, рекомендованных Президиумом Высшей аттестационной комиссии и зарубежных научных журналах. По теме диссертации </a:t>
+            </a:r>
+            <a:r>
+              <a:rPr lang="ru-RU" sz="1400" b="1" dirty="0"/>
+              <a:t>опубликовано </a:t>
+            </a:r>
+            <a:r>
+              <a:rPr lang="ru-RU" sz="1400" b="1" dirty="0" smtClean="0"/>
+              <a:t>24 </a:t>
+            </a:r>
+            <a:r>
+              <a:rPr lang="ru-RU" sz="1400" b="1" dirty="0"/>
+              <a:t>печатные работы</a:t>
+            </a:r>
+            <a:r>
+              <a:rPr lang="ru-RU" sz="1400" dirty="0"/>
+              <a:t>, включая </a:t>
+            </a:r>
+            <a:r>
+              <a:rPr lang="ru-RU" sz="1400" b="1" dirty="0" smtClean="0"/>
+              <a:t>21 тезис </a:t>
+            </a:r>
+            <a:r>
+              <a:rPr lang="ru-RU" sz="1400" b="1" dirty="0"/>
+              <a:t>конференций</a:t>
+            </a:r>
+            <a:r>
+              <a:rPr lang="ru-RU" sz="1400" dirty="0"/>
+              <a:t>, </a:t>
+            </a:r>
+            <a:r>
+              <a:rPr lang="ru-RU" sz="1400" b="1" dirty="0"/>
+              <a:t>6 реферируемых изданий </a:t>
+            </a:r>
+            <a:r>
+              <a:rPr lang="ru-RU" sz="1400" dirty="0"/>
+              <a:t>и </a:t>
+            </a:r>
+            <a:r>
+              <a:rPr lang="ru-RU" sz="1400" b="1" dirty="0"/>
+              <a:t>4 патента</a:t>
+            </a:r>
+            <a:r>
+              <a:rPr lang="ru-RU" sz="1400" dirty="0" smtClean="0"/>
+              <a:t>.</a:t>
+            </a:r>
+            <a:endParaRPr lang="ru-RU" sz="1400" dirty="0"/>
+          </a:p>
+          <a:p>
+            <a:pPr marL="0" indent="0">
+              <a:buNone/>
+            </a:pPr>
+            <a:r>
+              <a:rPr lang="ru-RU" sz="1400" dirty="0"/>
+              <a:t>Среди перечисленных, стоит отметить следующие конференции:</a:t>
+            </a:r>
+          </a:p>
+          <a:p>
+            <a:pPr marL="0" indent="0">
+              <a:buNone/>
+            </a:pPr>
+            <a:r>
+              <a:rPr lang="ru-RU" sz="1400" dirty="0"/>
+              <a:t>1.	</a:t>
+            </a:r>
+            <a:r>
+              <a:rPr lang="en-US" sz="1400" dirty="0"/>
+              <a:t>Myasoedov A.G., Kudryavtsev V.N. SAR and optical imagery of mesa scale ocean currents. 7th All </a:t>
+            </a:r>
+            <a:r>
+              <a:rPr lang="en-US" sz="1400" dirty="0" err="1"/>
+              <a:t>russian</a:t>
+            </a:r>
+            <a:r>
+              <a:rPr lang="en-US" sz="1400" dirty="0"/>
+              <a:t> Opened Conference “</a:t>
+            </a:r>
+            <a:r>
+              <a:rPr lang="en-US" sz="1400" b="1" dirty="0"/>
+              <a:t>Modern Problems of Earth Remote Sensing from Space</a:t>
+            </a:r>
+            <a:r>
+              <a:rPr lang="en-US" sz="1400" dirty="0"/>
+              <a:t>”, Moscow, Russia, November 2009.</a:t>
+            </a:r>
+          </a:p>
+          <a:p>
+            <a:pPr marL="0" indent="0">
+              <a:buNone/>
+            </a:pPr>
+            <a:r>
+              <a:rPr lang="en-US" sz="1400" dirty="0"/>
+              <a:t>2.	Myasoedov, A., V. Kudryavtsev, B. Chapron, and J. Johannessen, (2010). Sun glitter imagery of the ocean phenomena, Proc. </a:t>
+            </a:r>
+            <a:r>
+              <a:rPr lang="en-US" sz="1400" b="1" dirty="0"/>
+              <a:t>3rd </a:t>
+            </a:r>
+            <a:r>
+              <a:rPr lang="en-US" sz="1400" b="1" dirty="0" err="1"/>
+              <a:t>SeaSAR</a:t>
+            </a:r>
+            <a:r>
+              <a:rPr lang="en-US" sz="1400" b="1" dirty="0"/>
+              <a:t> workshop </a:t>
+            </a:r>
+            <a:r>
+              <a:rPr lang="en-US" sz="1400" dirty="0"/>
+              <a:t>“Advances in SAR Oceanography from ENVISAT, ERS and ESA third party missions”, ESA SP679.</a:t>
+            </a:r>
+          </a:p>
+          <a:p>
+            <a:pPr marL="0" indent="0">
+              <a:buNone/>
+            </a:pPr>
+            <a:r>
+              <a:rPr lang="ru-RU" sz="1400" dirty="0" smtClean="0"/>
+              <a:t>3</a:t>
+            </a:r>
+            <a:r>
+              <a:rPr lang="en-US" sz="1400" dirty="0" smtClean="0"/>
+              <a:t>.	Myasoedov A., Kudryavtsev V., Chapron B., Johannessen J., (2010). SAR and Optical Imagery of Mesoscale Ocean Currents. Proceedings of the </a:t>
+            </a:r>
+            <a:r>
+              <a:rPr lang="en-US" sz="1400" b="1" dirty="0" smtClean="0"/>
+              <a:t>ESA Living Planet Symposium 2010</a:t>
+            </a:r>
+            <a:r>
+              <a:rPr lang="en-US" sz="1400" dirty="0" smtClean="0"/>
+              <a:t>, Bergen, Norway, ESA SP-686.</a:t>
+            </a:r>
+          </a:p>
+          <a:p>
+            <a:pPr marL="0" indent="0">
+              <a:buNone/>
+            </a:pPr>
+            <a:r>
+              <a:rPr lang="ru-RU" sz="1400" dirty="0" smtClean="0"/>
+              <a:t>4</a:t>
+            </a:r>
+            <a:r>
+              <a:rPr lang="en-US" sz="1400" dirty="0" smtClean="0"/>
+              <a:t>.</a:t>
+            </a:r>
+            <a:r>
+              <a:rPr lang="en-US" sz="1400" dirty="0"/>
+              <a:t>	Myasoedov A., V. Kudryavtsev, B. Chapron, J. Johannessen, and F. Collard. Sun glitter as a "tool" for monitoring the Ocean from Space. </a:t>
+            </a:r>
+            <a:r>
+              <a:rPr lang="en-US" sz="1400" b="1" dirty="0"/>
+              <a:t>39th COSPAR Scientific Assembly</a:t>
+            </a:r>
+            <a:r>
+              <a:rPr lang="en-US" sz="1400" dirty="0"/>
+              <a:t>, 14-22 July 2012, Mysore, India.</a:t>
+            </a:r>
+          </a:p>
+          <a:p>
+            <a:pPr marL="0" indent="0">
+              <a:buNone/>
+            </a:pPr>
+            <a:r>
+              <a:rPr lang="ru-RU" sz="1400" dirty="0" smtClean="0"/>
+              <a:t>5</a:t>
+            </a:r>
+            <a:r>
+              <a:rPr lang="en-US" sz="1400" dirty="0" smtClean="0"/>
+              <a:t>.	Myasoedov </a:t>
+            </a:r>
+            <a:r>
+              <a:rPr lang="en-US" sz="1400" dirty="0"/>
+              <a:t>A., V. Kudryavtsev, B. Chapron, F. Collard and J. Johannessen. On dual-polarized SAR measurements of the Ocean surface. 6th International Workshop on Science and Applications of SAR Polarimetry and Polarimetric Interferometry, </a:t>
+            </a:r>
+            <a:r>
+              <a:rPr lang="en-US" sz="1400" b="1" dirty="0" err="1"/>
+              <a:t>POLinSAR</a:t>
+            </a:r>
+            <a:r>
+              <a:rPr lang="en-US" sz="1400" b="1" dirty="0"/>
+              <a:t> 2013</a:t>
+            </a:r>
+            <a:r>
+              <a:rPr lang="en-US" sz="1400" dirty="0"/>
+              <a:t>, 28 January – 1February 2013, Frascati (Rome), Italy</a:t>
+            </a:r>
+            <a:r>
+              <a:rPr lang="en-US" sz="1400" dirty="0" smtClean="0"/>
+              <a:t>.</a:t>
+            </a:r>
+            <a:endParaRPr lang="ru-RU" sz="1400" dirty="0" smtClean="0"/>
+          </a:p>
+          <a:p>
+            <a:pPr marL="0" indent="0">
+              <a:buNone/>
+            </a:pPr>
+            <a:endParaRPr lang="en-US" sz="1400" dirty="0"/>
+          </a:p>
+          <a:p>
+            <a:r>
+              <a:rPr lang="ru-RU" sz="1400" dirty="0"/>
+              <a:t>Результаты проделанной работы также докладывались и обсуждались на различных </a:t>
+            </a:r>
+            <a:r>
+              <a:rPr lang="ru-RU" sz="1400" b="1" dirty="0"/>
+              <a:t>международных научных семинарах</a:t>
+            </a:r>
+            <a:r>
+              <a:rPr lang="ru-RU" sz="1400" dirty="0"/>
+              <a:t> как за рубежом (в </a:t>
+            </a:r>
+            <a:r>
+              <a:rPr lang="ru-RU" sz="1400" b="1" dirty="0"/>
+              <a:t>Норвегии</a:t>
+            </a:r>
+            <a:r>
+              <a:rPr lang="ru-RU" sz="1400" dirty="0"/>
+              <a:t>, </a:t>
+            </a:r>
+            <a:r>
+              <a:rPr lang="ru-RU" sz="1400" b="1" dirty="0"/>
+              <a:t>Франции</a:t>
+            </a:r>
+            <a:r>
+              <a:rPr lang="ru-RU" sz="1400" dirty="0"/>
+              <a:t>, </a:t>
+            </a:r>
+            <a:r>
+              <a:rPr lang="ru-RU" sz="1400" b="1" dirty="0"/>
+              <a:t>Финляндии</a:t>
+            </a:r>
+            <a:r>
+              <a:rPr lang="ru-RU" sz="1400" dirty="0"/>
+              <a:t> и </a:t>
+            </a:r>
+            <a:r>
+              <a:rPr lang="ru-RU" sz="1400" b="1" dirty="0"/>
+              <a:t>Италии</a:t>
+            </a:r>
+            <a:r>
+              <a:rPr lang="ru-RU" sz="1400" dirty="0"/>
+              <a:t>), так и в </a:t>
+            </a:r>
+            <a:r>
+              <a:rPr lang="ru-RU" sz="1400" b="1" dirty="0"/>
+              <a:t>России</a:t>
+            </a:r>
+            <a:r>
+              <a:rPr lang="ru-RU" sz="1400" dirty="0"/>
+              <a:t>.</a:t>
+            </a:r>
           </a:p>
         </p:txBody>
       </p:sp>
     </p:spTree>
     <p:extLst>
       <p:ext uri="{BB962C8B-B14F-4D97-AF65-F5344CB8AC3E}">
-        <p14:creationId xmlns="" xmlns:p14="http://schemas.microsoft.com/office/powerpoint/2010/main" val="2650785243"/>
+        <p14:creationId xmlns:p14="http://schemas.microsoft.com/office/powerpoint/2010/main" xmlns="" val="1826961429"/>
       </p:ext>
     </p:extLst>
   </p:cSld>
   <p:clrMapOvr>
     <a:masterClrMapping/>
   </p:clrMapOvr>
+  <p:transition>
+    <p:fade/>
+  </p:transition>
   <p:timing>
     <p:tnLst>
       <p:par>
@@ -15468,138 +17114,7 @@
 </p:sld>
 </file>
 
-<file path=ppt/slides/slide2.xml><?xml version="1.0" encoding="utf-8"?>
-<p:sld xmlns:a="http://schemas.openxmlformats.org/drawingml/2006/main" xmlns:r="http://schemas.openxmlformats.org/officeDocument/2006/relationships" xmlns:p="http://schemas.openxmlformats.org/presentationml/2006/main">
-  <p:cSld>
-    <p:spTree>
-      <p:nvGrpSpPr>
-        <p:cNvPr id="1" name=""/>
-        <p:cNvGrpSpPr/>
-        <p:nvPr/>
-      </p:nvGrpSpPr>
-      <p:grpSpPr>
-        <a:xfrm>
-          <a:off x="0" y="0"/>
-          <a:ext cx="0" cy="0"/>
-          <a:chOff x="0" y="0"/>
-          <a:chExt cx="0" cy="0"/>
-        </a:xfrm>
-      </p:grpSpPr>
-      <p:sp>
-        <p:nvSpPr>
-          <p:cNvPr id="5" name="Заголовок 4"/>
-          <p:cNvSpPr>
-            <a:spLocks noGrp="1"/>
-          </p:cNvSpPr>
-          <p:nvPr>
-            <p:ph type="title" idx="4294967295"/>
-          </p:nvPr>
-        </p:nvSpPr>
-        <p:spPr>
-          <a:xfrm>
-            <a:off x="457200" y="-171400"/>
-            <a:ext cx="8229600" cy="1252537"/>
-          </a:xfrm>
-        </p:spPr>
-        <p:txBody>
-          <a:bodyPr>
-            <a:normAutofit/>
-          </a:bodyPr>
-          <a:lstStyle/>
-          <a:p>
-            <a:r>
-              <a:rPr lang="ru-RU" dirty="0"/>
-              <a:t>Актуальность темы </a:t>
-            </a:r>
-            <a:r>
-              <a:rPr lang="ru-RU" dirty="0" smtClean="0"/>
-              <a:t>диссертации</a:t>
-            </a:r>
-            <a:endParaRPr lang="en-US" dirty="0"/>
-          </a:p>
-        </p:txBody>
-      </p:sp>
-      <p:sp>
-        <p:nvSpPr>
-          <p:cNvPr id="6" name="Объект 5"/>
-          <p:cNvSpPr>
-            <a:spLocks noGrp="1"/>
-          </p:cNvSpPr>
-          <p:nvPr>
-            <p:ph idx="4294967295"/>
-          </p:nvPr>
-        </p:nvSpPr>
-        <p:spPr>
-          <a:xfrm>
-            <a:off x="323529" y="1484785"/>
-            <a:ext cx="8640959" cy="5112866"/>
-          </a:xfrm>
-        </p:spPr>
-        <p:txBody>
-          <a:bodyPr>
-            <a:normAutofit fontScale="85000" lnSpcReduction="20000"/>
-          </a:bodyPr>
-          <a:lstStyle/>
-          <a:p>
-            <a:r>
-              <a:rPr lang="ru-RU" dirty="0"/>
-              <a:t>Методы исследования Океана из космоса являются бурно развивающимися в настоящее время. Радиолокаторы с синтезированной апертурой (РСА) в силу всепогодности наблюдений и высокого пространственного разрешения являются одним из наиболее эффективных и перспективных инструментов.  Возможность регулярного мониторинга мезомасштабных и синоптических явлений в океанах (границы течений, вихри, фронтальные разделы, внутренние волны и др.) является исключительно важной для ряда геофизических приложений</a:t>
-            </a:r>
-            <a:r>
-              <a:rPr lang="ru-RU" dirty="0" smtClean="0"/>
-              <a:t>.</a:t>
-            </a:r>
-          </a:p>
-          <a:p>
-            <a:endParaRPr lang="en-US" dirty="0"/>
-          </a:p>
-          <a:p>
-            <a:r>
-              <a:rPr lang="ru-RU" dirty="0"/>
-              <a:t>Идентификация океанических течений методами РСА возможна лишь через их проявления в «шероховатостях» морской поверхности. Эта проблема далека от своего решения</a:t>
-            </a:r>
-            <a:r>
-              <a:rPr lang="ru-RU" dirty="0" smtClean="0"/>
-              <a:t>.</a:t>
-            </a:r>
-          </a:p>
-          <a:p>
-            <a:endParaRPr lang="en-US" dirty="0"/>
-          </a:p>
-          <a:p>
-            <a:r>
-              <a:rPr lang="ru-RU" dirty="0"/>
-              <a:t>С другой стороны в настоящее время большинство спутников оборудовано оптическими сканерами, которые также потенциально можно использовать для исследования поверхностных проявлений на морской поверхности</a:t>
-            </a:r>
-            <a:r>
-              <a:rPr lang="ru-RU" dirty="0" smtClean="0"/>
-              <a:t>.</a:t>
-            </a:r>
-            <a:endParaRPr lang="en-US" dirty="0"/>
-          </a:p>
-        </p:txBody>
-      </p:sp>
-    </p:spTree>
-    <p:extLst>
-      <p:ext uri="{BB962C8B-B14F-4D97-AF65-F5344CB8AC3E}">
-        <p14:creationId xmlns="" xmlns:p14="http://schemas.microsoft.com/office/powerpoint/2010/main" val="4088170398"/>
-      </p:ext>
-    </p:extLst>
-  </p:cSld>
-  <p:clrMapOvr>
-    <a:masterClrMapping/>
-  </p:clrMapOvr>
-  <p:timing>
-    <p:tnLst>
-      <p:par>
-        <p:cTn id="1" dur="indefinite" restart="never" nodeType="tmRoot"/>
-      </p:par>
-    </p:tnLst>
-  </p:timing>
-</p:sld>
-</file>
-
-<file path=ppt/slides/slide3.xml><?xml version="1.0" encoding="utf-8"?>
+<file path=ppt/slides/slide11.xml><?xml version="1.0" encoding="utf-8"?>
 <p:sld xmlns:a="http://schemas.openxmlformats.org/drawingml/2006/main" xmlns:r="http://schemas.openxmlformats.org/officeDocument/2006/relationships" xmlns:p="http://schemas.openxmlformats.org/presentationml/2006/main">
   <p:cSld>
     <p:spTree>
@@ -15628,19 +17143,22 @@
         </p:nvSpPr>
         <p:spPr>
           <a:xfrm>
-            <a:off x="457200" y="-199801"/>
+            <a:off x="457200" y="88231"/>
             <a:ext cx="8229600" cy="1252537"/>
           </a:xfrm>
         </p:spPr>
         <p:txBody>
-          <a:bodyPr/>
+          <a:bodyPr>
+            <a:noAutofit/>
+          </a:bodyPr>
           <a:lstStyle/>
           <a:p>
-            <a:r>
-              <a:rPr lang="ru-RU" dirty="0" smtClean="0"/>
-              <a:t>Цель и Задачи Исследования</a:t>
-            </a:r>
-            <a:endParaRPr lang="en-US" dirty="0"/>
+            <a:pPr algn="r"/>
+            <a:r>
+              <a:rPr lang="ru-RU" sz="4000" dirty="0"/>
+              <a:t>Список работ, опубликованных по теме диссертации</a:t>
+            </a:r>
+            <a:endParaRPr lang="en-US" sz="4000" dirty="0"/>
           </a:p>
         </p:txBody>
       </p:sp>
@@ -15656,134 +17174,145 @@
         </p:nvSpPr>
         <p:spPr>
           <a:xfrm>
-            <a:off x="224644" y="1219201"/>
-            <a:ext cx="8694712" cy="5162128"/>
+            <a:off x="224644" y="1412776"/>
+            <a:ext cx="8694712" cy="5184576"/>
           </a:xfrm>
         </p:spPr>
         <p:txBody>
           <a:bodyPr>
-            <a:normAutofit fontScale="70000" lnSpcReduction="20000"/>
+            <a:noAutofit/>
           </a:bodyPr>
           <a:lstStyle/>
           <a:p>
-            <a:pPr marL="0" indent="0">
-              <a:buNone/>
-            </a:pPr>
-            <a:r>
-              <a:rPr lang="ru-RU" b="1" dirty="0" smtClean="0"/>
-              <a:t>Цель работы</a:t>
-            </a:r>
-            <a:endParaRPr lang="en-US" b="1" dirty="0" smtClean="0"/>
-          </a:p>
-          <a:p>
-            <a:r>
-              <a:rPr lang="en-US" dirty="0" smtClean="0"/>
-              <a:t>Р</a:t>
-            </a:r>
-            <a:r>
-              <a:rPr lang="ru-RU" dirty="0" smtClean="0"/>
-              <a:t>азработка </a:t>
-            </a:r>
-            <a:r>
-              <a:rPr lang="ru-RU" dirty="0" smtClean="0"/>
-              <a:t>метода исследования поверхности Океана по спутниковым изображениям солнечного блика, и применение этого метода для исследования нефтяных загрязнений и поверхностных проявлений динамических процессов в Океане</a:t>
-            </a:r>
-            <a:r>
-              <a:rPr lang="ru-RU" dirty="0" smtClean="0"/>
-              <a:t>.</a:t>
-            </a:r>
-            <a:endParaRPr lang="en-US" dirty="0" smtClean="0"/>
-          </a:p>
-          <a:p>
-            <a:pPr marL="0" indent="0">
-              <a:buNone/>
-            </a:pPr>
-            <a:r>
-              <a:rPr lang="ru-RU" b="1" dirty="0" smtClean="0"/>
-              <a:t>Задачи исследования</a:t>
-            </a:r>
-            <a:endParaRPr lang="en-US" b="1" dirty="0" smtClean="0"/>
-          </a:p>
-          <a:p>
-            <a:pPr lvl="0"/>
-            <a:r>
-              <a:rPr lang="ru-RU" dirty="0" smtClean="0"/>
-              <a:t>разработать метод восстановления пространственных вариаций среднеквадратичного наклона (СКН) морской поверхности по полю яркости солнечного блика;</a:t>
-            </a:r>
-            <a:endParaRPr lang="en-US" dirty="0" smtClean="0"/>
-          </a:p>
-          <a:p>
-            <a:pPr lvl="0"/>
-            <a:r>
-              <a:rPr lang="ru-RU" dirty="0" smtClean="0"/>
-              <a:t>применить разработанный метод для анализа данных спутниковых оптических сканеров </a:t>
-            </a:r>
-            <a:r>
-              <a:rPr lang="en-US" dirty="0" smtClean="0"/>
-              <a:t>MODIS</a:t>
-            </a:r>
-            <a:r>
-              <a:rPr lang="ru-RU" dirty="0" smtClean="0"/>
-              <a:t> и </a:t>
-            </a:r>
-            <a:r>
-              <a:rPr lang="en-US" dirty="0" smtClean="0"/>
-              <a:t>MERIS</a:t>
-            </a:r>
-            <a:r>
-              <a:rPr lang="ru-RU" dirty="0" smtClean="0"/>
-              <a:t>;</a:t>
-            </a:r>
-            <a:endParaRPr lang="en-US" dirty="0" smtClean="0"/>
-          </a:p>
-          <a:p>
-            <a:pPr lvl="0"/>
-            <a:r>
-              <a:rPr lang="ru-RU" dirty="0" smtClean="0"/>
-              <a:t>исследовать поверхностные проявления биологических и нефтяных сликов в солнечном блике и в поле СКН морской поверхности, а также исследовать подобие и отличия аномалий «шероховатости» морской поверхности в сликах, измеряемых оптическими и радиолокационными методами;</a:t>
-            </a:r>
-            <a:endParaRPr lang="en-US" dirty="0" smtClean="0"/>
-          </a:p>
-          <a:p>
-            <a:pPr lvl="0"/>
-            <a:r>
-              <a:rPr lang="ru-RU" dirty="0" smtClean="0"/>
-              <a:t>исследовать особенности проявления внутренних волн и мезомасштабных течений на морской поверхности по изображениям солнечного блика;</a:t>
-            </a:r>
-            <a:endParaRPr lang="en-US" dirty="0" smtClean="0"/>
-          </a:p>
-          <a:p>
-            <a:pPr lvl="0"/>
-            <a:r>
-              <a:rPr lang="ru-RU" dirty="0" smtClean="0"/>
-              <a:t>исследовать связь аномалий характеристик «шероховатости» морской поверхности с параметрами мезомасштабных течений на основе синергетического анализа оптических и радиолокационных изображений;</a:t>
-            </a:r>
-            <a:endParaRPr lang="en-US" dirty="0" smtClean="0"/>
-          </a:p>
-          <a:p>
-            <a:pPr lvl="0"/>
-            <a:r>
-              <a:rPr lang="ru-RU" dirty="0" smtClean="0"/>
-              <a:t>создать специализированное программно-математическое обеспечение, сопровождающее разработанные методы</a:t>
-            </a:r>
-            <a:r>
-              <a:rPr lang="ru-RU" dirty="0" smtClean="0"/>
-              <a:t>.</a:t>
-            </a:r>
-            <a:endParaRPr lang="en-US" dirty="0" smtClean="0"/>
+            <a:r>
+              <a:rPr lang="ru-RU" sz="1600" b="1" i="1" dirty="0"/>
+              <a:t>Издания из списка ВАК и зарубежные журналы</a:t>
+            </a:r>
+            <a:endParaRPr lang="en-US" sz="1600" b="1" i="1" dirty="0"/>
+          </a:p>
+          <a:p>
+            <a:r>
+              <a:rPr lang="en-US" sz="1600" dirty="0"/>
+              <a:t>1. </a:t>
+            </a:r>
+            <a:r>
+              <a:rPr lang="en-US" sz="1600" b="1" dirty="0"/>
+              <a:t>Myasoedov A.G.</a:t>
+            </a:r>
+            <a:r>
+              <a:rPr lang="en-US" sz="1600" dirty="0"/>
+              <a:t>, Kudryavtsev V.N. Quantification of the surface manifestation of ocean phenomena from sun glitter imagery. // Proceedings of the Russian State Hydrometeorological University. A theoretical research journal. 2010. </a:t>
+            </a:r>
+            <a:r>
+              <a:rPr lang="ru-RU" sz="1600" dirty="0"/>
+              <a:t>С</a:t>
+            </a:r>
+            <a:r>
+              <a:rPr lang="en-US" sz="1600" dirty="0"/>
+              <a:t>. 94–115.</a:t>
+            </a:r>
+          </a:p>
+          <a:p>
+            <a:r>
+              <a:rPr lang="en-US" sz="1600" dirty="0"/>
+              <a:t>2. Kozlov I.E., Kudryavtsev V.N., Johannessen J.A., Chapron B., Dailidienė I., </a:t>
+            </a:r>
+            <a:r>
+              <a:rPr lang="en-US" sz="1600" b="1" dirty="0"/>
+              <a:t>Myasoedov A.G.</a:t>
+            </a:r>
+            <a:r>
+              <a:rPr lang="en-US" sz="1600" dirty="0"/>
+              <a:t> ASAR imaging for coastal upwelling in the Baltic Sea. // Advances in Space Research. 2012. № 50. С. 1125–1137.</a:t>
+            </a:r>
+          </a:p>
+          <a:p>
+            <a:r>
+              <a:rPr lang="en-US" sz="1600" dirty="0"/>
+              <a:t>3. Kudryavtsev V., </a:t>
+            </a:r>
+            <a:r>
+              <a:rPr lang="en-US" sz="1600" b="1" dirty="0"/>
+              <a:t>Myasoedov A.</a:t>
+            </a:r>
+            <a:r>
+              <a:rPr lang="en-US" sz="1600" dirty="0"/>
+              <a:t>, Chapron B., Johannessen J.A., Collard F. Imaging mesoscale upper ocean dynamics using synthetic aperture radar and optical data. // Journal of Geophysical Research. 2012. № 117. С. C04029.</a:t>
+            </a:r>
+          </a:p>
+          <a:p>
+            <a:r>
+              <a:rPr lang="en-US" sz="1600" dirty="0"/>
+              <a:t>4. Kudryavtsev V., </a:t>
+            </a:r>
+            <a:r>
+              <a:rPr lang="en-US" sz="1600" b="1" dirty="0"/>
+              <a:t>Myasoedov A.</a:t>
+            </a:r>
+            <a:r>
+              <a:rPr lang="en-US" sz="1600" dirty="0"/>
+              <a:t>, Chapron B., Johannessen J.A., Collard F. Joint sun-glitter and radar imagery of surface slicks. // Remote Sensing of Environment. 2012. № 120. С. 123–132.</a:t>
+            </a:r>
+          </a:p>
+          <a:p>
+            <a:r>
+              <a:rPr lang="en-US" sz="1600" dirty="0"/>
+              <a:t>5. Kudryavtsev V.N., Chapron B., </a:t>
+            </a:r>
+            <a:r>
+              <a:rPr lang="en-US" sz="1600" b="1" dirty="0"/>
+              <a:t>Myasoedov A.G.</a:t>
+            </a:r>
+            <a:r>
+              <a:rPr lang="en-US" sz="1600" dirty="0"/>
+              <a:t>, Collard F., Johannessen J.A. On Dual Co-Polarized SAR Measurements of the Ocean Surface. // IEEE Geoscience and Remote Sensing Letters. 2013. № PP. С. 1–5.</a:t>
+            </a:r>
+          </a:p>
+          <a:p>
+            <a:r>
+              <a:rPr lang="ru-RU" sz="1600" dirty="0"/>
+              <a:t>6. Зимин А.В., Родионов А.А., Шапрон Б., </a:t>
+            </a:r>
+            <a:r>
+              <a:rPr lang="ru-RU" sz="1600" dirty="0" err="1"/>
+              <a:t>Романенков</a:t>
+            </a:r>
+            <a:r>
+              <a:rPr lang="ru-RU" sz="1600" dirty="0"/>
+              <a:t> Д.А., </a:t>
+            </a:r>
+            <a:r>
+              <a:rPr lang="ru-RU" sz="1600" dirty="0" err="1"/>
+              <a:t>Здоровеннов</a:t>
+            </a:r>
+            <a:r>
+              <a:rPr lang="ru-RU" sz="1600" dirty="0"/>
+              <a:t> Р.Э., Козлов И.Е., </a:t>
+            </a:r>
+            <a:r>
+              <a:rPr lang="ru-RU" sz="1600" b="1" dirty="0"/>
+              <a:t>Мясоедов А.Г.</a:t>
+            </a:r>
+            <a:r>
+              <a:rPr lang="ru-RU" sz="1600" dirty="0"/>
+              <a:t>, Шевчук О.И. Работы с научно-исследовательского судна «Эколог» по проекту «Мегагрант» в белом море, выполненные в июле-августе 2012 года. // Учёные записки Российского государственного гидрометеорологического университета. 2013. (в печати)</a:t>
+            </a:r>
           </a:p>
         </p:txBody>
       </p:sp>
     </p:spTree>
     <p:extLst>
       <p:ext uri="{BB962C8B-B14F-4D97-AF65-F5344CB8AC3E}">
-        <p14:creationId xmlns="" xmlns:p14="http://schemas.microsoft.com/office/powerpoint/2010/main" val="14512996"/>
+        <p14:creationId xmlns:p14="http://schemas.microsoft.com/office/powerpoint/2010/main" xmlns="" val="2273188979"/>
       </p:ext>
     </p:extLst>
   </p:cSld>
   <p:clrMapOvr>
     <a:masterClrMapping/>
   </p:clrMapOvr>
+  <p:transition>
+    <p:fade/>
+  </p:transition>
   <p:timing>
     <p:tnLst>
       <p:par>
@@ -15794,7 +17323,264 @@
 </p:sld>
 </file>
 
-<file path=ppt/slides/slide4.xml><?xml version="1.0" encoding="utf-8"?>
+<file path=ppt/slides/slide12.xml><?xml version="1.0" encoding="utf-8"?>
+<p:sld xmlns:a="http://schemas.openxmlformats.org/drawingml/2006/main" xmlns:r="http://schemas.openxmlformats.org/officeDocument/2006/relationships" xmlns:p="http://schemas.openxmlformats.org/presentationml/2006/main">
+  <p:cSld>
+    <p:spTree>
+      <p:nvGrpSpPr>
+        <p:cNvPr id="1" name=""/>
+        <p:cNvGrpSpPr/>
+        <p:nvPr/>
+      </p:nvGrpSpPr>
+      <p:grpSpPr>
+        <a:xfrm>
+          <a:off x="0" y="0"/>
+          <a:ext cx="0" cy="0"/>
+          <a:chOff x="0" y="0"/>
+          <a:chExt cx="0" cy="0"/>
+        </a:xfrm>
+      </p:grpSpPr>
+      <p:sp>
+        <p:nvSpPr>
+          <p:cNvPr id="2" name="Заголовок 1"/>
+          <p:cNvSpPr>
+            <a:spLocks noGrp="1"/>
+          </p:cNvSpPr>
+          <p:nvPr>
+            <p:ph type="title" idx="4294967295"/>
+          </p:nvPr>
+        </p:nvSpPr>
+        <p:spPr>
+          <a:xfrm>
+            <a:off x="457200" y="88231"/>
+            <a:ext cx="8229600" cy="1252537"/>
+          </a:xfrm>
+        </p:spPr>
+        <p:txBody>
+          <a:bodyPr>
+            <a:noAutofit/>
+          </a:bodyPr>
+          <a:lstStyle/>
+          <a:p>
+            <a:pPr algn="r"/>
+            <a:r>
+              <a:rPr lang="ru-RU" sz="4000" dirty="0"/>
+              <a:t>Список работ, опубликованных по теме диссертации</a:t>
+            </a:r>
+            <a:endParaRPr lang="en-US" sz="4000" dirty="0"/>
+          </a:p>
+        </p:txBody>
+      </p:sp>
+      <p:sp>
+        <p:nvSpPr>
+          <p:cNvPr id="3" name="Объект 2"/>
+          <p:cNvSpPr>
+            <a:spLocks noGrp="1"/>
+          </p:cNvSpPr>
+          <p:nvPr>
+            <p:ph idx="4294967295"/>
+          </p:nvPr>
+        </p:nvSpPr>
+        <p:spPr>
+          <a:xfrm>
+            <a:off x="224644" y="1340768"/>
+            <a:ext cx="8694712" cy="5400600"/>
+          </a:xfrm>
+        </p:spPr>
+        <p:txBody>
+          <a:bodyPr>
+            <a:noAutofit/>
+          </a:bodyPr>
+          <a:lstStyle/>
+          <a:p>
+            <a:r>
+              <a:rPr lang="ru-RU" sz="1600" b="1" i="1" dirty="0"/>
+              <a:t>Патенты</a:t>
+            </a:r>
+            <a:endParaRPr lang="en-US" sz="1600" b="1" i="1" dirty="0"/>
+          </a:p>
+          <a:p>
+            <a:pPr lvl="0"/>
+            <a:r>
+              <a:rPr lang="ru-RU" sz="1600" b="1" dirty="0"/>
+              <a:t>Мясоедов А.Г.</a:t>
+            </a:r>
+            <a:r>
+              <a:rPr lang="ru-RU" sz="1600" dirty="0"/>
+              <a:t>, Кудрявцев В.Н. Свидетельство о государственной регистрации программы для ЭВМ №2011610860: GLAMOROS: Оценка контрастов поверхностных проявлений океанических явлений по изображениям солнечного блика. Заявка № 2010617455. Дата поступления 22 ноября 2010г. Зарегистрировано в Реестре программ для ЭВМ 20 января 2011г.</a:t>
+            </a:r>
+            <a:endParaRPr lang="en-US" sz="1600" dirty="0"/>
+          </a:p>
+          <a:p>
+            <a:pPr lvl="0"/>
+            <a:r>
+              <a:rPr lang="ru-RU" sz="1600" b="1" dirty="0"/>
+              <a:t>Мясоедов А.Г.</a:t>
+            </a:r>
+            <a:r>
+              <a:rPr lang="ru-RU" sz="1600" dirty="0"/>
+              <a:t>, Кудрявцев В.Н., Шапрон Б.Ж.А., Коллард Ф.Ж.К. Свидетельство о государственной регистрации программы для ЭВМ №2012660424 DUPOL: «Оценка характеристик поверхности Океана по двух-поляризационным радиолокационным изображениям из Космоса» Заявка № 2012617706. Дата поступления 9 октября 2012г. Зарегистрировано в Реестре программ для ЭВМ 19 ноября 2012г.</a:t>
+            </a:r>
+            <a:endParaRPr lang="en-US" sz="1600" dirty="0"/>
+          </a:p>
+          <a:p>
+            <a:pPr lvl="0"/>
+            <a:r>
+              <a:rPr lang="ru-RU" sz="1600" b="1" dirty="0"/>
+              <a:t>Мясоедов А.Г.</a:t>
+            </a:r>
+            <a:r>
+              <a:rPr lang="ru-RU" sz="1600" dirty="0"/>
+              <a:t>, Козлов И.Е. Свидетельство о государственной регистрации программы для ЭВМ №2012660637 INTERWAVE: «Определение характеристик океанских внутренних волн по их проявлениям в спутниковых радиолокационных снимках морской поверхности» Заявка № 2012618623. Дата поступления 10 октября 2012г. Зарегистрировано в Реестре программ для ЭВМ 26 ноября 2012г.</a:t>
+            </a:r>
+            <a:endParaRPr lang="en-US" sz="1600" dirty="0"/>
+          </a:p>
+          <a:p>
+            <a:pPr lvl="0"/>
+            <a:r>
+              <a:rPr lang="ru-RU" sz="1600" dirty="0"/>
+              <a:t>Зимин А.В., Козлов И.Е., </a:t>
+            </a:r>
+            <a:r>
+              <a:rPr lang="ru-RU" sz="1600" b="1" dirty="0"/>
+              <a:t>Мясоедов А.Г.</a:t>
+            </a:r>
+            <a:r>
+              <a:rPr lang="ru-RU" sz="1600" dirty="0"/>
+              <a:t>, </a:t>
+            </a:r>
+            <a:r>
+              <a:rPr lang="ru-RU" sz="1600" dirty="0" err="1"/>
+              <a:t>Мохнаткин</a:t>
+            </a:r>
+            <a:r>
+              <a:rPr lang="ru-RU" sz="1600" dirty="0"/>
+              <a:t> Ф.Ю. Свидетельство о государственной регистрации базы данных №2012621188 «Проявления внутренних волн по данным контактных и спутниковых наблюдений в Белом море в 2010 году (ВВ БМ 2010)» Заявка № 2012621065. Дата поступления 9 октября 2012г. Зарегистрировано в Реестре баз данных 19 ноября 2012г.</a:t>
+            </a:r>
+            <a:endParaRPr lang="en-US" sz="1600" dirty="0"/>
+          </a:p>
+        </p:txBody>
+      </p:sp>
+    </p:spTree>
+    <p:extLst>
+      <p:ext uri="{BB962C8B-B14F-4D97-AF65-F5344CB8AC3E}">
+        <p14:creationId xmlns:p14="http://schemas.microsoft.com/office/powerpoint/2010/main" xmlns="" val="166832219"/>
+      </p:ext>
+    </p:extLst>
+  </p:cSld>
+  <p:clrMapOvr>
+    <a:masterClrMapping/>
+  </p:clrMapOvr>
+  <p:transition>
+    <p:fade/>
+  </p:transition>
+  <p:timing>
+    <p:tnLst>
+      <p:par>
+        <p:cTn id="1" dur="indefinite" restart="never" nodeType="tmRoot"/>
+      </p:par>
+    </p:tnLst>
+  </p:timing>
+</p:sld>
+</file>
+
+<file path=ppt/slides/slide13.xml><?xml version="1.0" encoding="utf-8"?>
+<p:sld xmlns:a="http://schemas.openxmlformats.org/drawingml/2006/main" xmlns:r="http://schemas.openxmlformats.org/officeDocument/2006/relationships" xmlns:p="http://schemas.openxmlformats.org/presentationml/2006/main">
+  <p:cSld>
+    <p:spTree>
+      <p:nvGrpSpPr>
+        <p:cNvPr id="1" name=""/>
+        <p:cNvGrpSpPr/>
+        <p:nvPr/>
+      </p:nvGrpSpPr>
+      <p:grpSpPr>
+        <a:xfrm>
+          <a:off x="0" y="0"/>
+          <a:ext cx="0" cy="0"/>
+          <a:chOff x="0" y="0"/>
+          <a:chExt cx="0" cy="0"/>
+        </a:xfrm>
+      </p:grpSpPr>
+      <p:sp>
+        <p:nvSpPr>
+          <p:cNvPr id="2" name="Заголовок 1"/>
+          <p:cNvSpPr>
+            <a:spLocks noGrp="1"/>
+          </p:cNvSpPr>
+          <p:nvPr>
+            <p:ph type="title" idx="4294967295"/>
+          </p:nvPr>
+        </p:nvSpPr>
+        <p:spPr>
+          <a:xfrm>
+            <a:off x="457200" y="-171400"/>
+            <a:ext cx="8229600" cy="1252537"/>
+          </a:xfrm>
+        </p:spPr>
+        <p:txBody>
+          <a:bodyPr>
+            <a:noAutofit/>
+          </a:bodyPr>
+          <a:lstStyle/>
+          <a:p>
+            <a:r>
+              <a:rPr lang="ru-RU" sz="4000" dirty="0" smtClean="0"/>
+              <a:t>Благодарности</a:t>
+            </a:r>
+            <a:endParaRPr lang="en-US" sz="4000" dirty="0"/>
+          </a:p>
+        </p:txBody>
+      </p:sp>
+      <p:sp>
+        <p:nvSpPr>
+          <p:cNvPr id="3" name="Объект 2"/>
+          <p:cNvSpPr>
+            <a:spLocks noGrp="1"/>
+          </p:cNvSpPr>
+          <p:nvPr>
+            <p:ph idx="4294967295"/>
+          </p:nvPr>
+        </p:nvSpPr>
+        <p:spPr>
+          <a:xfrm>
+            <a:off x="224644" y="1451917"/>
+            <a:ext cx="8694712" cy="4929411"/>
+          </a:xfrm>
+        </p:spPr>
+        <p:txBody>
+          <a:bodyPr>
+            <a:normAutofit/>
+          </a:bodyPr>
+          <a:lstStyle/>
+          <a:p>
+            <a:endParaRPr lang="en-US" dirty="0"/>
+          </a:p>
+        </p:txBody>
+      </p:sp>
+    </p:spTree>
+    <p:extLst>
+      <p:ext uri="{BB962C8B-B14F-4D97-AF65-F5344CB8AC3E}">
+        <p14:creationId xmlns:p14="http://schemas.microsoft.com/office/powerpoint/2010/main" xmlns="" val="2650785243"/>
+      </p:ext>
+    </p:extLst>
+  </p:cSld>
+  <p:clrMapOvr>
+    <a:masterClrMapping/>
+  </p:clrMapOvr>
+  <p:transition>
+    <p:fade/>
+  </p:transition>
+  <p:timing>
+    <p:tnLst>
+      <p:par>
+        <p:cTn id="1" dur="indefinite" restart="never" nodeType="tmRoot"/>
+      </p:par>
+    </p:tnLst>
+  </p:timing>
+</p:sld>
+</file>
+
+<file path=ppt/slides/slide14.xml><?xml version="1.0" encoding="utf-8"?>
 <p:sld xmlns:a="http://schemas.openxmlformats.org/drawingml/2006/main" xmlns:r="http://schemas.openxmlformats.org/officeDocument/2006/relationships" xmlns:p="http://schemas.openxmlformats.org/presentationml/2006/main">
   <p:cSld>
     <p:spTree>
@@ -16657,7 +18443,7 @@
           </a:ln>
           <a:extLst>
             <a:ext uri="{909E8E84-426E-40DD-AFC4-6F175D3DCCD1}">
-              <a14:hiddenFill xmlns="" xmlns:a14="http://schemas.microsoft.com/office/drawing/2010/main">
+              <a14:hiddenFill xmlns:a14="http://schemas.microsoft.com/office/drawing/2010/main" xmlns="">
                 <a:solidFill>
                   <a:srgbClr val="FFFFFF"/>
                 </a:solidFill>
@@ -16700,7 +18486,7 @@
           </a:ln>
           <a:extLst>
             <a:ext uri="{909E8E84-426E-40DD-AFC4-6F175D3DCCD1}">
-              <a14:hiddenFill xmlns="" xmlns:a14="http://schemas.microsoft.com/office/drawing/2010/main">
+              <a14:hiddenFill xmlns:a14="http://schemas.microsoft.com/office/drawing/2010/main" xmlns="">
                 <a:solidFill>
                   <a:srgbClr val="FFFFFF"/>
                 </a:solidFill>
@@ -16738,14 +18524,14 @@
           </a:ln>
           <a:extLst>
             <a:ext uri="{909E8E84-426E-40DD-AFC4-6F175D3DCCD1}">
-              <a14:hiddenFill xmlns="" xmlns:a14="http://schemas.microsoft.com/office/drawing/2010/main">
+              <a14:hiddenFill xmlns:a14="http://schemas.microsoft.com/office/drawing/2010/main" xmlns="">
                 <a:solidFill>
                   <a:srgbClr val="FFFFFF"/>
                 </a:solidFill>
               </a14:hiddenFill>
             </a:ext>
             <a:ext uri="{91240B29-F687-4F45-9708-019B960494DF}">
-              <a14:hiddenLine xmlns="" xmlns:a14="http://schemas.microsoft.com/office/drawing/2010/main" w="9525">
+              <a14:hiddenLine xmlns:a14="http://schemas.microsoft.com/office/drawing/2010/main" xmlns="" w="9525">
                 <a:solidFill>
                   <a:srgbClr val="000000"/>
                 </a:solidFill>
@@ -17166,7 +18952,7 @@
           </a:ln>
           <a:extLst>
             <a:ext uri="{909E8E84-426E-40DD-AFC4-6F175D3DCCD1}">
-              <a14:hiddenFill xmlns="" xmlns:a14="http://schemas.microsoft.com/office/drawing/2010/main">
+              <a14:hiddenFill xmlns:a14="http://schemas.microsoft.com/office/drawing/2010/main" xmlns="">
                 <a:solidFill>
                   <a:srgbClr val="FFFFFF"/>
                 </a:solidFill>
@@ -17211,7 +18997,7 @@
           </a:ln>
           <a:extLst>
             <a:ext uri="{909E8E84-426E-40DD-AFC4-6F175D3DCCD1}">
-              <a14:hiddenFill xmlns="" xmlns:a14="http://schemas.microsoft.com/office/drawing/2010/main">
+              <a14:hiddenFill xmlns:a14="http://schemas.microsoft.com/office/drawing/2010/main" xmlns="">
                 <a:noFill/>
               </a14:hiddenFill>
             </a:ext>
@@ -17247,7 +19033,7 @@
           </a:ln>
           <a:extLst>
             <a:ext uri="{909E8E84-426E-40DD-AFC4-6F175D3DCCD1}">
-              <a14:hiddenFill xmlns="" xmlns:a14="http://schemas.microsoft.com/office/drawing/2010/main">
+              <a14:hiddenFill xmlns:a14="http://schemas.microsoft.com/office/drawing/2010/main" xmlns="">
                 <a:noFill/>
               </a14:hiddenFill>
             </a:ext>
@@ -17283,7 +19069,7 @@
           </a:ln>
           <a:extLst>
             <a:ext uri="{909E8E84-426E-40DD-AFC4-6F175D3DCCD1}">
-              <a14:hiddenFill xmlns="" xmlns:a14="http://schemas.microsoft.com/office/drawing/2010/main">
+              <a14:hiddenFill xmlns:a14="http://schemas.microsoft.com/office/drawing/2010/main" xmlns="">
                 <a:noFill/>
               </a14:hiddenFill>
             </a:ext>
@@ -17318,7 +19104,7 @@
           </a:ln>
           <a:extLst>
             <a:ext uri="{909E8E84-426E-40DD-AFC4-6F175D3DCCD1}">
-              <a14:hiddenFill xmlns="" xmlns:a14="http://schemas.microsoft.com/office/drawing/2010/main">
+              <a14:hiddenFill xmlns:a14="http://schemas.microsoft.com/office/drawing/2010/main" xmlns="">
                 <a:noFill/>
               </a14:hiddenFill>
             </a:ext>
@@ -17354,7 +19140,7 @@
           </a:ln>
           <a:extLst>
             <a:ext uri="{909E8E84-426E-40DD-AFC4-6F175D3DCCD1}">
-              <a14:hiddenFill xmlns="" xmlns:a14="http://schemas.microsoft.com/office/drawing/2010/main">
+              <a14:hiddenFill xmlns:a14="http://schemas.microsoft.com/office/drawing/2010/main" xmlns="">
                 <a:noFill/>
               </a14:hiddenFill>
             </a:ext>
@@ -17390,7 +19176,7 @@
           </a:ln>
           <a:extLst>
             <a:ext uri="{909E8E84-426E-40DD-AFC4-6F175D3DCCD1}">
-              <a14:hiddenFill xmlns="" xmlns:a14="http://schemas.microsoft.com/office/drawing/2010/main">
+              <a14:hiddenFill xmlns:a14="http://schemas.microsoft.com/office/drawing/2010/main" xmlns="">
                 <a:noFill/>
               </a14:hiddenFill>
             </a:ext>
@@ -17426,7 +19212,7 @@
           </a:ln>
           <a:extLst>
             <a:ext uri="{909E8E84-426E-40DD-AFC4-6F175D3DCCD1}">
-              <a14:hiddenFill xmlns="" xmlns:a14="http://schemas.microsoft.com/office/drawing/2010/main">
+              <a14:hiddenFill xmlns:a14="http://schemas.microsoft.com/office/drawing/2010/main" xmlns="">
                 <a:noFill/>
               </a14:hiddenFill>
             </a:ext>
@@ -17462,7 +19248,7 @@
           </a:ln>
           <a:extLst>
             <a:ext uri="{909E8E84-426E-40DD-AFC4-6F175D3DCCD1}">
-              <a14:hiddenFill xmlns="" xmlns:a14="http://schemas.microsoft.com/office/drawing/2010/main">
+              <a14:hiddenFill xmlns:a14="http://schemas.microsoft.com/office/drawing/2010/main" xmlns="">
                 <a:noFill/>
               </a14:hiddenFill>
             </a:ext>
@@ -17498,7 +19284,7 @@
           </a:ln>
           <a:extLst>
             <a:ext uri="{909E8E84-426E-40DD-AFC4-6F175D3DCCD1}">
-              <a14:hiddenFill xmlns="" xmlns:a14="http://schemas.microsoft.com/office/drawing/2010/main">
+              <a14:hiddenFill xmlns:a14="http://schemas.microsoft.com/office/drawing/2010/main" xmlns="">
                 <a:noFill/>
               </a14:hiddenFill>
             </a:ext>
@@ -17534,7 +19320,7 @@
           </a:ln>
           <a:extLst>
             <a:ext uri="{909E8E84-426E-40DD-AFC4-6F175D3DCCD1}">
-              <a14:hiddenFill xmlns="" xmlns:a14="http://schemas.microsoft.com/office/drawing/2010/main">
+              <a14:hiddenFill xmlns:a14="http://schemas.microsoft.com/office/drawing/2010/main" xmlns="">
                 <a:noFill/>
               </a14:hiddenFill>
             </a:ext>
@@ -17570,7 +19356,7 @@
           </a:ln>
           <a:extLst>
             <a:ext uri="{909E8E84-426E-40DD-AFC4-6F175D3DCCD1}">
-              <a14:hiddenFill xmlns="" xmlns:a14="http://schemas.microsoft.com/office/drawing/2010/main">
+              <a14:hiddenFill xmlns:a14="http://schemas.microsoft.com/office/drawing/2010/main" xmlns="">
                 <a:noFill/>
               </a14:hiddenFill>
             </a:ext>
@@ -17606,7 +19392,7 @@
           </a:ln>
           <a:extLst>
             <a:ext uri="{909E8E84-426E-40DD-AFC4-6F175D3DCCD1}">
-              <a14:hiddenFill xmlns="" xmlns:a14="http://schemas.microsoft.com/office/drawing/2010/main">
+              <a14:hiddenFill xmlns:a14="http://schemas.microsoft.com/office/drawing/2010/main" xmlns="">
                 <a:noFill/>
               </a14:hiddenFill>
             </a:ext>
@@ -17616,13 +19402,377 @@
     </p:spTree>
     <p:extLst>
       <p:ext uri="{BB962C8B-B14F-4D97-AF65-F5344CB8AC3E}">
-        <p14:creationId xmlns="" xmlns:p14="http://schemas.microsoft.com/office/powerpoint/2010/main" val="2274414641"/>
+        <p14:creationId xmlns:p14="http://schemas.microsoft.com/office/powerpoint/2010/main" xmlns="" val="2274414641"/>
       </p:ext>
     </p:extLst>
   </p:cSld>
   <p:clrMapOvr>
     <a:masterClrMapping/>
   </p:clrMapOvr>
+  <p:transition>
+    <p:fade/>
+  </p:transition>
+  <p:timing>
+    <p:tnLst>
+      <p:par>
+        <p:cTn id="1" dur="indefinite" restart="never" nodeType="tmRoot"/>
+      </p:par>
+    </p:tnLst>
+  </p:timing>
+</p:sld>
+</file>
+
+<file path=ppt/slides/slide2.xml><?xml version="1.0" encoding="utf-8"?>
+<p:sld xmlns:a="http://schemas.openxmlformats.org/drawingml/2006/main" xmlns:r="http://schemas.openxmlformats.org/officeDocument/2006/relationships" xmlns:p="http://schemas.openxmlformats.org/presentationml/2006/main">
+  <p:cSld>
+    <p:spTree>
+      <p:nvGrpSpPr>
+        <p:cNvPr id="1" name=""/>
+        <p:cNvGrpSpPr/>
+        <p:nvPr/>
+      </p:nvGrpSpPr>
+      <p:grpSpPr>
+        <a:xfrm>
+          <a:off x="0" y="0"/>
+          <a:ext cx="0" cy="0"/>
+          <a:chOff x="0" y="0"/>
+          <a:chExt cx="0" cy="0"/>
+        </a:xfrm>
+      </p:grpSpPr>
+      <p:sp>
+        <p:nvSpPr>
+          <p:cNvPr id="4" name="Content Placeholder 3"/>
+          <p:cNvSpPr>
+            <a:spLocks noGrp="1"/>
+          </p:cNvSpPr>
+          <p:nvPr>
+            <p:ph idx="1"/>
+          </p:nvPr>
+        </p:nvSpPr>
+        <p:spPr>
+          <a:xfrm>
+            <a:off x="867834" y="2514600"/>
+            <a:ext cx="7408333" cy="4114800"/>
+          </a:xfrm>
+        </p:spPr>
+        <p:txBody>
+          <a:bodyPr>
+            <a:normAutofit/>
+          </a:bodyPr>
+          <a:lstStyle/>
+          <a:p>
+            <a:r>
+              <a:rPr lang="ru-RU" dirty="0" smtClean="0"/>
+              <a:t>В работе предложен новый метод обработки и анализа спутниковы изображений солнечного блика и его применение для исследования океанических процессов</a:t>
+            </a:r>
+            <a:r>
+              <a:rPr lang="ru-RU" dirty="0" smtClean="0"/>
+              <a:t>.</a:t>
+            </a:r>
+            <a:endParaRPr lang="en-US" dirty="0" smtClean="0"/>
+          </a:p>
+          <a:p>
+            <a:endParaRPr lang="en-US" dirty="0" smtClean="0"/>
+          </a:p>
+          <a:p>
+            <a:r>
+              <a:rPr lang="ru-RU" dirty="0" smtClean="0"/>
+              <a:t>Оригинальность работы состоит в том, что данные оптических спутниковых измерений в солнечном блике обычно отбрасываются как сильная «шумовая помеха», не позволяющая исследовать особенности цвета океана.</a:t>
+            </a:r>
+            <a:endParaRPr lang="en-US" dirty="0" smtClean="0"/>
+          </a:p>
+          <a:p>
+            <a:endParaRPr lang="en-US" dirty="0"/>
+          </a:p>
+        </p:txBody>
+      </p:sp>
+      <p:sp>
+        <p:nvSpPr>
+          <p:cNvPr id="5" name="Заголовок 4"/>
+          <p:cNvSpPr>
+            <a:spLocks noGrp="1"/>
+          </p:cNvSpPr>
+          <p:nvPr>
+            <p:ph type="title"/>
+          </p:nvPr>
+        </p:nvSpPr>
+        <p:spPr/>
+        <p:txBody>
+          <a:bodyPr>
+            <a:normAutofit/>
+          </a:bodyPr>
+          <a:lstStyle/>
+          <a:p>
+            <a:r>
+              <a:rPr lang="ru-RU" dirty="0"/>
+              <a:t>Актуальность темы </a:t>
+            </a:r>
+            <a:r>
+              <a:rPr lang="ru-RU" dirty="0" smtClean="0"/>
+              <a:t>диссертации</a:t>
+            </a:r>
+            <a:endParaRPr lang="en-US" dirty="0"/>
+          </a:p>
+        </p:txBody>
+      </p:sp>
+    </p:spTree>
+    <p:extLst>
+      <p:ext uri="{BB962C8B-B14F-4D97-AF65-F5344CB8AC3E}">
+        <p14:creationId xmlns:p14="http://schemas.microsoft.com/office/powerpoint/2010/main" xmlns="" val="4088170398"/>
+      </p:ext>
+    </p:extLst>
+  </p:cSld>
+  <p:clrMapOvr>
+    <a:masterClrMapping/>
+  </p:clrMapOvr>
+  <p:transition>
+    <p:fade/>
+  </p:transition>
+  <p:timing>
+    <p:tnLst>
+      <p:par>
+        <p:cTn id="1" dur="indefinite" restart="never" nodeType="tmRoot"/>
+      </p:par>
+    </p:tnLst>
+  </p:timing>
+</p:sld>
+</file>
+
+<file path=ppt/slides/slide3.xml><?xml version="1.0" encoding="utf-8"?>
+<p:sld xmlns:a="http://schemas.openxmlformats.org/drawingml/2006/main" xmlns:r="http://schemas.openxmlformats.org/officeDocument/2006/relationships" xmlns:p="http://schemas.openxmlformats.org/presentationml/2006/main">
+  <p:cSld>
+    <p:spTree>
+      <p:nvGrpSpPr>
+        <p:cNvPr id="1" name=""/>
+        <p:cNvGrpSpPr/>
+        <p:nvPr/>
+      </p:nvGrpSpPr>
+      <p:grpSpPr>
+        <a:xfrm>
+          <a:off x="0" y="0"/>
+          <a:ext cx="0" cy="0"/>
+          <a:chOff x="0" y="0"/>
+          <a:chExt cx="0" cy="0"/>
+        </a:xfrm>
+      </p:grpSpPr>
+      <p:pic>
+        <p:nvPicPr>
+          <p:cNvPr id="1026" name="Picture 210"/>
+          <p:cNvPicPr>
+            <a:picLocks noChangeAspect="1" noChangeArrowheads="1"/>
+          </p:cNvPicPr>
+          <p:nvPr/>
+        </p:nvPicPr>
+        <p:blipFill>
+          <a:blip r:embed="rId2"/>
+          <a:srcRect/>
+          <a:stretch>
+            <a:fillRect/>
+          </a:stretch>
+        </p:blipFill>
+        <p:spPr bwMode="auto">
+          <a:xfrm>
+            <a:off x="382322" y="2286000"/>
+            <a:ext cx="8379357" cy="4191000"/>
+          </a:xfrm>
+          <a:prstGeom prst="rect">
+            <a:avLst/>
+          </a:prstGeom>
+          <a:noFill/>
+          <a:ln w="9525">
+            <a:noFill/>
+            <a:miter lim="800000"/>
+            <a:headEnd/>
+            <a:tailEnd/>
+          </a:ln>
+        </p:spPr>
+      </p:pic>
+      <p:sp>
+        <p:nvSpPr>
+          <p:cNvPr id="6" name="Title 5"/>
+          <p:cNvSpPr>
+            <a:spLocks noGrp="1"/>
+          </p:cNvSpPr>
+          <p:nvPr>
+            <p:ph type="title"/>
+          </p:nvPr>
+        </p:nvSpPr>
+        <p:spPr/>
+        <p:txBody>
+          <a:bodyPr>
+            <a:normAutofit fontScale="90000"/>
+          </a:bodyPr>
+          <a:lstStyle/>
+          <a:p>
+            <a:r>
+              <a:rPr lang="ru-RU" dirty="0" smtClean="0"/>
+              <a:t>Маска </a:t>
+            </a:r>
+            <a:r>
+              <a:rPr lang="ru-RU" dirty="0" smtClean="0"/>
+              <a:t>«засвеченных» солнечным бликом </a:t>
+            </a:r>
+            <a:r>
+              <a:rPr lang="ru-RU" dirty="0" smtClean="0"/>
+              <a:t>данны</a:t>
+            </a:r>
+            <a:r>
+              <a:rPr lang="en-US" dirty="0" smtClean="0"/>
+              <a:t>х</a:t>
+            </a:r>
+            <a:r>
+              <a:rPr lang="ru-RU" dirty="0" smtClean="0"/>
+              <a:t> </a:t>
+            </a:r>
+            <a:r>
+              <a:rPr lang="ru-RU" dirty="0" smtClean="0"/>
+              <a:t>сканера MODIS</a:t>
+            </a:r>
+            <a:endParaRPr lang="en-US" dirty="0"/>
+          </a:p>
+        </p:txBody>
+      </p:sp>
+    </p:spTree>
+  </p:cSld>
+  <p:clrMapOvr>
+    <a:masterClrMapping/>
+  </p:clrMapOvr>
+  <p:transition>
+    <p:fade/>
+  </p:transition>
+  <p:timing>
+    <p:tnLst>
+      <p:par>
+        <p:cTn id="1" dur="indefinite" restart="never" nodeType="tmRoot"/>
+      </p:par>
+    </p:tnLst>
+  </p:timing>
+</p:sld>
+</file>
+
+<file path=ppt/slides/slide4.xml><?xml version="1.0" encoding="utf-8"?>
+<p:sld xmlns:a="http://schemas.openxmlformats.org/drawingml/2006/main" xmlns:r="http://schemas.openxmlformats.org/officeDocument/2006/relationships" xmlns:p="http://schemas.openxmlformats.org/presentationml/2006/main">
+  <p:cSld>
+    <p:spTree>
+      <p:nvGrpSpPr>
+        <p:cNvPr id="1" name=""/>
+        <p:cNvGrpSpPr/>
+        <p:nvPr/>
+      </p:nvGrpSpPr>
+      <p:grpSpPr>
+        <a:xfrm>
+          <a:off x="0" y="0"/>
+          <a:ext cx="0" cy="0"/>
+          <a:chOff x="0" y="0"/>
+          <a:chExt cx="0" cy="0"/>
+        </a:xfrm>
+      </p:grpSpPr>
+      <p:sp>
+        <p:nvSpPr>
+          <p:cNvPr id="6" name="Объект 5"/>
+          <p:cNvSpPr>
+            <a:spLocks noGrp="1"/>
+          </p:cNvSpPr>
+          <p:nvPr>
+            <p:ph idx="1"/>
+          </p:nvPr>
+        </p:nvSpPr>
+        <p:spPr>
+          <a:xfrm>
+            <a:off x="266700" y="2438400"/>
+            <a:ext cx="8610600" cy="4191000"/>
+          </a:xfrm>
+        </p:spPr>
+        <p:txBody>
+          <a:bodyPr>
+            <a:noAutofit/>
+          </a:bodyPr>
+          <a:lstStyle/>
+          <a:p>
+            <a:r>
+              <a:rPr lang="ru-RU" sz="2200" dirty="0" smtClean="0"/>
+              <a:t>Актуальность </a:t>
+            </a:r>
+            <a:r>
+              <a:rPr lang="ru-RU" sz="2200" dirty="0" smtClean="0"/>
+              <a:t>данного исследования определяется </a:t>
+            </a:r>
+            <a:r>
+              <a:rPr lang="ru-RU" sz="2200" dirty="0" smtClean="0"/>
+              <a:t>необходимостью </a:t>
+            </a:r>
+            <a:r>
+              <a:rPr lang="ru-RU" sz="2200" dirty="0" smtClean="0"/>
+              <a:t>разработки нового метода, позволяющего использовать отбрасываемые ранее данные оптических сканеров для исследования проявления различных динамических процессов на поверхности Океана</a:t>
+            </a:r>
+            <a:r>
+              <a:rPr lang="ru-RU" sz="2200" dirty="0" smtClean="0"/>
+              <a:t>.</a:t>
+            </a:r>
+            <a:endParaRPr lang="en-US" sz="2200" dirty="0" smtClean="0"/>
+          </a:p>
+          <a:p>
+            <a:endParaRPr lang="en-US" sz="2200" dirty="0" smtClean="0"/>
+          </a:p>
+          <a:p>
+            <a:r>
+              <a:rPr lang="ru-RU" sz="2200" dirty="0" smtClean="0"/>
+              <a:t>В </a:t>
+            </a:r>
+            <a:r>
+              <a:rPr lang="ru-RU" sz="2200" dirty="0" smtClean="0"/>
+              <a:t>данной работе показано, что отраженная солнечная радиация несет очень важную информацию о поверхностных проявлениях различных динамических процессов в океане, которая может быть использована в различных научных и практических приложениях</a:t>
+            </a:r>
+            <a:r>
+              <a:rPr lang="ru-RU" sz="2200" dirty="0" smtClean="0"/>
+              <a:t>.</a:t>
+            </a:r>
+            <a:endParaRPr lang="ru-RU" sz="2200" dirty="0" smtClean="0"/>
+          </a:p>
+        </p:txBody>
+      </p:sp>
+      <p:sp>
+        <p:nvSpPr>
+          <p:cNvPr id="5" name="Заголовок 4"/>
+          <p:cNvSpPr>
+            <a:spLocks noGrp="1"/>
+          </p:cNvSpPr>
+          <p:nvPr>
+            <p:ph type="title"/>
+          </p:nvPr>
+        </p:nvSpPr>
+        <p:spPr/>
+        <p:txBody>
+          <a:bodyPr>
+            <a:normAutofit/>
+          </a:bodyPr>
+          <a:lstStyle/>
+          <a:p>
+            <a:r>
+              <a:rPr lang="ru-RU" dirty="0"/>
+              <a:t>Актуальность темы </a:t>
+            </a:r>
+            <a:r>
+              <a:rPr lang="ru-RU" dirty="0" smtClean="0"/>
+              <a:t>диссертации</a:t>
+            </a:r>
+            <a:endParaRPr lang="en-US" dirty="0"/>
+          </a:p>
+        </p:txBody>
+      </p:sp>
+    </p:spTree>
+    <p:extLst>
+      <p:ext uri="{BB962C8B-B14F-4D97-AF65-F5344CB8AC3E}">
+        <p14:creationId xmlns:p14="http://schemas.microsoft.com/office/powerpoint/2010/main" xmlns="" val="4088170398"/>
+      </p:ext>
+    </p:extLst>
+  </p:cSld>
+  <p:clrMapOvr>
+    <a:masterClrMapping/>
+  </p:clrMapOvr>
+  <p:transition>
+    <p:fade/>
+  </p:transition>
   <p:timing>
     <p:tnLst>
       <p:par>
@@ -17634,6 +19784,541 @@
 </file>
 
 <file path=ppt/slides/slide5.xml><?xml version="1.0" encoding="utf-8"?>
+<p:sld xmlns:a="http://schemas.openxmlformats.org/drawingml/2006/main" xmlns:r="http://schemas.openxmlformats.org/officeDocument/2006/relationships" xmlns:p="http://schemas.openxmlformats.org/presentationml/2006/main">
+  <p:cSld>
+    <p:spTree>
+      <p:nvGrpSpPr>
+        <p:cNvPr id="1" name=""/>
+        <p:cNvGrpSpPr/>
+        <p:nvPr/>
+      </p:nvGrpSpPr>
+      <p:grpSpPr>
+        <a:xfrm>
+          <a:off x="0" y="0"/>
+          <a:ext cx="0" cy="0"/>
+          <a:chOff x="0" y="0"/>
+          <a:chExt cx="0" cy="0"/>
+        </a:xfrm>
+      </p:grpSpPr>
+      <p:sp>
+        <p:nvSpPr>
+          <p:cNvPr id="3" name="Объект 2"/>
+          <p:cNvSpPr>
+            <a:spLocks noGrp="1"/>
+          </p:cNvSpPr>
+          <p:nvPr>
+            <p:ph idx="1"/>
+          </p:nvPr>
+        </p:nvSpPr>
+        <p:spPr/>
+        <p:txBody>
+          <a:bodyPr>
+            <a:noAutofit/>
+          </a:bodyPr>
+          <a:lstStyle/>
+          <a:p>
+            <a:r>
+              <a:rPr lang="en-US" dirty="0" smtClean="0"/>
+              <a:t>Р</a:t>
+            </a:r>
+            <a:r>
+              <a:rPr lang="ru-RU" dirty="0" smtClean="0"/>
+              <a:t>азработка метода исследования поверхности Океана по спутниковым изображениям солнечного </a:t>
+            </a:r>
+            <a:r>
+              <a:rPr lang="ru-RU" dirty="0" smtClean="0"/>
+              <a:t>блика, и применение </a:t>
+            </a:r>
+            <a:r>
+              <a:rPr lang="ru-RU" dirty="0" smtClean="0"/>
+              <a:t>этого метода для исследования нефтяных загрязнений и поверхностных проявлений динамических процессов в Океане</a:t>
+            </a:r>
+            <a:r>
+              <a:rPr lang="ru-RU" dirty="0" smtClean="0"/>
+              <a:t>.</a:t>
+            </a:r>
+            <a:endParaRPr lang="en-US" dirty="0" smtClean="0"/>
+          </a:p>
+        </p:txBody>
+      </p:sp>
+      <p:sp>
+        <p:nvSpPr>
+          <p:cNvPr id="2" name="Заголовок 1"/>
+          <p:cNvSpPr>
+            <a:spLocks noGrp="1"/>
+          </p:cNvSpPr>
+          <p:nvPr>
+            <p:ph type="title"/>
+          </p:nvPr>
+        </p:nvSpPr>
+        <p:spPr/>
+        <p:txBody>
+          <a:bodyPr/>
+          <a:lstStyle/>
+          <a:p>
+            <a:r>
+              <a:rPr lang="ru-RU" dirty="0" smtClean="0"/>
+              <a:t>Цель </a:t>
+            </a:r>
+            <a:r>
+              <a:rPr lang="ru-RU" dirty="0" smtClean="0"/>
+              <a:t>Исследования</a:t>
+            </a:r>
+            <a:endParaRPr lang="en-US" dirty="0"/>
+          </a:p>
+        </p:txBody>
+      </p:sp>
+    </p:spTree>
+    <p:extLst>
+      <p:ext uri="{BB962C8B-B14F-4D97-AF65-F5344CB8AC3E}">
+        <p14:creationId xmlns:p14="http://schemas.microsoft.com/office/powerpoint/2010/main" xmlns="" val="14512996"/>
+      </p:ext>
+    </p:extLst>
+  </p:cSld>
+  <p:clrMapOvr>
+    <a:masterClrMapping/>
+  </p:clrMapOvr>
+  <p:transition>
+    <p:fade/>
+  </p:transition>
+  <p:timing>
+    <p:tnLst>
+      <p:par>
+        <p:cTn id="1" dur="indefinite" restart="never" nodeType="tmRoot"/>
+      </p:par>
+    </p:tnLst>
+  </p:timing>
+</p:sld>
+</file>
+
+<file path=ppt/slides/slide6.xml><?xml version="1.0" encoding="utf-8"?>
+<p:sld xmlns:a="http://schemas.openxmlformats.org/drawingml/2006/main" xmlns:r="http://schemas.openxmlformats.org/officeDocument/2006/relationships" xmlns:p="http://schemas.openxmlformats.org/presentationml/2006/main">
+  <p:cSld>
+    <p:spTree>
+      <p:nvGrpSpPr>
+        <p:cNvPr id="1" name=""/>
+        <p:cNvGrpSpPr/>
+        <p:nvPr/>
+      </p:nvGrpSpPr>
+      <p:grpSpPr>
+        <a:xfrm>
+          <a:off x="0" y="0"/>
+          <a:ext cx="0" cy="0"/>
+          <a:chOff x="0" y="0"/>
+          <a:chExt cx="0" cy="0"/>
+        </a:xfrm>
+      </p:grpSpPr>
+      <p:sp>
+        <p:nvSpPr>
+          <p:cNvPr id="3" name="Объект 2"/>
+          <p:cNvSpPr>
+            <a:spLocks noGrp="1"/>
+          </p:cNvSpPr>
+          <p:nvPr>
+            <p:ph idx="1"/>
+          </p:nvPr>
+        </p:nvSpPr>
+        <p:spPr>
+          <a:xfrm>
+            <a:off x="228601" y="1371600"/>
+            <a:ext cx="8686800" cy="5257800"/>
+          </a:xfrm>
+        </p:spPr>
+        <p:txBody>
+          <a:bodyPr>
+            <a:noAutofit/>
+          </a:bodyPr>
+          <a:lstStyle/>
+          <a:p>
+            <a:r>
+              <a:rPr lang="ru-RU" sz="1900" dirty="0" smtClean="0"/>
+              <a:t>разработать метод восстановления пространственных вариаций </a:t>
+            </a:r>
+            <a:r>
+              <a:rPr lang="ru-RU" sz="1900" dirty="0" smtClean="0"/>
+              <a:t>еднеквадратичного </a:t>
+            </a:r>
+            <a:r>
+              <a:rPr lang="ru-RU" sz="1900" dirty="0" smtClean="0"/>
+              <a:t>наклона (СКН) морской поверхности по полю яркости солнечного блика;</a:t>
+            </a:r>
+            <a:endParaRPr lang="en-US" sz="1900" dirty="0" smtClean="0"/>
+          </a:p>
+          <a:p>
+            <a:r>
+              <a:rPr lang="ru-RU" sz="1900" dirty="0" smtClean="0"/>
+              <a:t>применить разработанный метод для анализа данных спутниковых оптических сканеров </a:t>
+            </a:r>
+            <a:r>
+              <a:rPr lang="en-US" sz="1900" dirty="0" smtClean="0"/>
+              <a:t>MODIS</a:t>
+            </a:r>
+            <a:r>
+              <a:rPr lang="ru-RU" sz="1900" dirty="0" smtClean="0"/>
+              <a:t> и </a:t>
+            </a:r>
+            <a:r>
+              <a:rPr lang="en-US" sz="1900" dirty="0" smtClean="0"/>
+              <a:t>MERIS</a:t>
+            </a:r>
+            <a:r>
+              <a:rPr lang="ru-RU" sz="1900" dirty="0" smtClean="0"/>
+              <a:t>;</a:t>
+            </a:r>
+            <a:endParaRPr lang="en-US" sz="1900" dirty="0" smtClean="0"/>
+          </a:p>
+          <a:p>
+            <a:r>
+              <a:rPr lang="ru-RU" sz="1900" dirty="0" smtClean="0"/>
+              <a:t>исследовать поверхностные проявления биологических и нефтяных сликов в солнечном блике и в поле СКН морской поверхности, а также исследовать подобие и отличия аномалий «шероховатости» морской поверхности в сликах, измеряемых оптическими и радиолокационными методами;</a:t>
+            </a:r>
+            <a:endParaRPr lang="en-US" sz="1900" dirty="0" smtClean="0"/>
+          </a:p>
+          <a:p>
+            <a:r>
+              <a:rPr lang="ru-RU" sz="1900" dirty="0" smtClean="0"/>
+              <a:t>исследовать особенности проявления внутренних волн и мезомасштабных течений на морской поверхности по изображениям солнечного блика;</a:t>
+            </a:r>
+            <a:endParaRPr lang="en-US" sz="1900" dirty="0" smtClean="0"/>
+          </a:p>
+          <a:p>
+            <a:r>
+              <a:rPr lang="ru-RU" sz="1900" dirty="0" smtClean="0"/>
+              <a:t>исследовать связь аномалий </a:t>
+            </a:r>
+            <a:r>
+              <a:rPr lang="ru-RU" sz="1900" dirty="0" smtClean="0"/>
+              <a:t>характристик </a:t>
+            </a:r>
+            <a:r>
+              <a:rPr lang="ru-RU" sz="1900" dirty="0" smtClean="0"/>
+              <a:t>«шероховатости» морской поверхности с параметрами мезомасштабных течений на основе синергетического анализа оптических и радиолокационных изображений;</a:t>
+            </a:r>
+            <a:endParaRPr lang="en-US" sz="1900" dirty="0" smtClean="0"/>
+          </a:p>
+          <a:p>
+            <a:r>
+              <a:rPr lang="ru-RU" sz="1900" dirty="0" smtClean="0"/>
+              <a:t>создать специализированное программно-математическое обеспечение, сопровождающее разработанные методы</a:t>
+            </a:r>
+            <a:r>
+              <a:rPr lang="ru-RU" sz="1900" dirty="0" smtClean="0"/>
+              <a:t>.</a:t>
+            </a:r>
+            <a:endParaRPr lang="en-US" sz="1900" dirty="0" smtClean="0"/>
+          </a:p>
+        </p:txBody>
+      </p:sp>
+      <p:sp>
+        <p:nvSpPr>
+          <p:cNvPr id="2" name="Заголовок 1"/>
+          <p:cNvSpPr>
+            <a:spLocks noGrp="1"/>
+          </p:cNvSpPr>
+          <p:nvPr>
+            <p:ph type="title"/>
+          </p:nvPr>
+        </p:nvSpPr>
+        <p:spPr/>
+        <p:txBody>
+          <a:bodyPr/>
+          <a:lstStyle/>
+          <a:p>
+            <a:r>
+              <a:rPr lang="en-US" dirty="0" err="1" smtClean="0"/>
+              <a:t>Задачи</a:t>
+            </a:r>
+            <a:r>
+              <a:rPr lang="en-US" dirty="0" smtClean="0"/>
+              <a:t> И</a:t>
+            </a:r>
+            <a:r>
+              <a:rPr lang="ru-RU" dirty="0" smtClean="0"/>
+              <a:t>сследования</a:t>
+            </a:r>
+            <a:endParaRPr lang="en-US" dirty="0"/>
+          </a:p>
+        </p:txBody>
+      </p:sp>
+    </p:spTree>
+    <p:extLst>
+      <p:ext uri="{BB962C8B-B14F-4D97-AF65-F5344CB8AC3E}">
+        <p14:creationId xmlns:p14="http://schemas.microsoft.com/office/powerpoint/2010/main" xmlns="" val="14512996"/>
+      </p:ext>
+    </p:extLst>
+  </p:cSld>
+  <p:clrMapOvr>
+    <a:masterClrMapping/>
+  </p:clrMapOvr>
+  <p:transition>
+    <p:fade/>
+  </p:transition>
+  <p:timing>
+    <p:tnLst>
+      <p:par>
+        <p:cTn id="1" dur="indefinite" restart="never" nodeType="tmRoot"/>
+      </p:par>
+    </p:tnLst>
+  </p:timing>
+</p:sld>
+</file>
+
+<file path=ppt/slides/slide7.xml><?xml version="1.0" encoding="utf-8"?>
+<p:sld xmlns:a="http://schemas.openxmlformats.org/drawingml/2006/main" xmlns:r="http://schemas.openxmlformats.org/officeDocument/2006/relationships" xmlns:p="http://schemas.openxmlformats.org/presentationml/2006/main">
+  <p:cSld>
+    <p:spTree>
+      <p:nvGrpSpPr>
+        <p:cNvPr id="1" name=""/>
+        <p:cNvGrpSpPr/>
+        <p:nvPr/>
+      </p:nvGrpSpPr>
+      <p:grpSpPr>
+        <a:xfrm>
+          <a:off x="0" y="0"/>
+          <a:ext cx="0" cy="0"/>
+          <a:chOff x="0" y="0"/>
+          <a:chExt cx="0" cy="0"/>
+        </a:xfrm>
+      </p:grpSpPr>
+      <p:sp>
+        <p:nvSpPr>
+          <p:cNvPr id="3" name="Объект 2"/>
+          <p:cNvSpPr>
+            <a:spLocks noGrp="1"/>
+          </p:cNvSpPr>
+          <p:nvPr>
+            <p:ph idx="1"/>
+          </p:nvPr>
+        </p:nvSpPr>
+        <p:spPr>
+          <a:xfrm>
+            <a:off x="215900" y="1752600"/>
+            <a:ext cx="8712200" cy="5105399"/>
+          </a:xfrm>
+        </p:spPr>
+        <p:txBody>
+          <a:bodyPr>
+            <a:normAutofit fontScale="85000" lnSpcReduction="10000"/>
+          </a:bodyPr>
+          <a:lstStyle/>
+          <a:p>
+            <a:pPr marL="514350" indent="-514350">
+              <a:buFont typeface="+mj-lt"/>
+              <a:buAutoNum type="romanUcPeriod"/>
+            </a:pPr>
+            <a:r>
+              <a:rPr lang="ru-RU" dirty="0" smtClean="0"/>
+              <a:t>разработанный метод </a:t>
+            </a:r>
+            <a:r>
+              <a:rPr lang="ru-RU" dirty="0" smtClean="0"/>
+              <a:t>позволяет </a:t>
+            </a:r>
+            <a:r>
+              <a:rPr lang="ru-RU" dirty="0" smtClean="0"/>
+              <a:t>работать с различными оптическими спектрометрами благодаря использованию передаточной функции, которая напрямую зависит от наблюдаемых градиентов яркости солнечного блика, </a:t>
+            </a:r>
+            <a:r>
+              <a:rPr lang="ru-RU" dirty="0" smtClean="0"/>
+              <a:t>бе</a:t>
+            </a:r>
+            <a:r>
+              <a:rPr lang="en-US" dirty="0" smtClean="0"/>
+              <a:t>з</a:t>
+            </a:r>
+            <a:r>
+              <a:rPr lang="ru-RU" dirty="0" smtClean="0"/>
+              <a:t> </a:t>
+            </a:r>
+            <a:r>
+              <a:rPr lang="ru-RU" dirty="0" smtClean="0"/>
+              <a:t>априорного задания плотности распределения уклонов;</a:t>
+            </a:r>
+          </a:p>
+          <a:p>
+            <a:pPr marL="514350" indent="-514350">
+              <a:buFont typeface="+mj-lt"/>
+              <a:buAutoNum type="romanUcPeriod"/>
+            </a:pPr>
+            <a:r>
+              <a:rPr lang="ru-RU" dirty="0" smtClean="0"/>
+              <a:t>контрасты СКН в нефтяных сликах </a:t>
+            </a:r>
+            <a:r>
+              <a:rPr lang="ru-RU" dirty="0" smtClean="0"/>
+              <a:t>ситематически </a:t>
+            </a:r>
+            <a:r>
+              <a:rPr lang="ru-RU" dirty="0" smtClean="0"/>
+              <a:t>ниже контрастов СКН в сликах биологического происхождения;</a:t>
+            </a:r>
+          </a:p>
+          <a:p>
+            <a:pPr marL="514350" indent="-514350">
+              <a:buFont typeface="+mj-lt"/>
+              <a:buAutoNum type="romanUcPeriod"/>
+            </a:pPr>
+            <a:r>
+              <a:rPr lang="ru-RU" dirty="0" smtClean="0"/>
+              <a:t>для одного и того же слика, сформированного тонкой нефтяной плёнкой, контрасты УЭПР примерно в 1.6 раза сильнее контрастов СКН;</a:t>
+            </a:r>
+          </a:p>
+          <a:p>
+            <a:pPr marL="514350" indent="-514350">
+              <a:buFont typeface="+mj-lt"/>
+              <a:buAutoNum type="romanUcPeriod"/>
+            </a:pPr>
+            <a:r>
+              <a:rPr lang="ru-RU" dirty="0" smtClean="0"/>
+              <a:t>поверхностные проявления ВВ и мезомасштабных течений отчётливо проявляются в модуляциях уклонов морской поверхности в результате усиления среднеквадратичного наклона (СКН) в зонах конвергенции течения, и его подавления в зонах дивергенции;</a:t>
+            </a:r>
+          </a:p>
+          <a:p>
+            <a:pPr marL="514350" indent="-514350">
+              <a:buFont typeface="+mj-lt"/>
+              <a:buAutoNum type="romanUcPeriod"/>
+            </a:pPr>
+            <a:r>
+              <a:rPr lang="ru-RU" dirty="0" smtClean="0"/>
+              <a:t>аномалии характеристик </a:t>
+            </a:r>
+            <a:r>
+              <a:rPr lang="ru-RU" dirty="0" smtClean="0"/>
+              <a:t>ветрового волнения (СКН, обрушения) связаны с зонами дивергенции течений и пространственно привязаны к областям сильных градиентов завихренности полей квази-геострофических течений.</a:t>
+            </a:r>
+          </a:p>
+        </p:txBody>
+      </p:sp>
+      <p:sp>
+        <p:nvSpPr>
+          <p:cNvPr id="2" name="Заголовок 1"/>
+          <p:cNvSpPr>
+            <a:spLocks noGrp="1"/>
+          </p:cNvSpPr>
+          <p:nvPr>
+            <p:ph type="title"/>
+          </p:nvPr>
+        </p:nvSpPr>
+        <p:spPr/>
+        <p:txBody>
+          <a:bodyPr>
+            <a:noAutofit/>
+          </a:bodyPr>
+          <a:lstStyle/>
+          <a:p>
+            <a:r>
+              <a:rPr lang="ru-RU" sz="4000" dirty="0"/>
+              <a:t>Положения, выносимые на защиту</a:t>
+            </a:r>
+            <a:endParaRPr lang="en-US" sz="4000" dirty="0"/>
+          </a:p>
+        </p:txBody>
+      </p:sp>
+    </p:spTree>
+    <p:extLst>
+      <p:ext uri="{BB962C8B-B14F-4D97-AF65-F5344CB8AC3E}">
+        <p14:creationId xmlns:p14="http://schemas.microsoft.com/office/powerpoint/2010/main" xmlns="" val="2227681646"/>
+      </p:ext>
+    </p:extLst>
+  </p:cSld>
+  <p:clrMapOvr>
+    <a:masterClrMapping/>
+  </p:clrMapOvr>
+  <p:transition>
+    <p:fade/>
+  </p:transition>
+  <p:timing>
+    <p:tnLst>
+      <p:par>
+        <p:cTn id="1" dur="indefinite" restart="never" nodeType="tmRoot"/>
+      </p:par>
+    </p:tnLst>
+  </p:timing>
+</p:sld>
+</file>
+
+<file path=ppt/slides/slide8.xml><?xml version="1.0" encoding="utf-8"?>
+<p:sld xmlns:a="http://schemas.openxmlformats.org/drawingml/2006/main" xmlns:r="http://schemas.openxmlformats.org/officeDocument/2006/relationships" xmlns:p="http://schemas.openxmlformats.org/presentationml/2006/main">
+  <p:cSld>
+    <p:spTree>
+      <p:nvGrpSpPr>
+        <p:cNvPr id="1" name=""/>
+        <p:cNvGrpSpPr/>
+        <p:nvPr/>
+      </p:nvGrpSpPr>
+      <p:grpSpPr>
+        <a:xfrm>
+          <a:off x="0" y="0"/>
+          <a:ext cx="0" cy="0"/>
+          <a:chOff x="0" y="0"/>
+          <a:chExt cx="0" cy="0"/>
+        </a:xfrm>
+      </p:grpSpPr>
+      <p:sp>
+        <p:nvSpPr>
+          <p:cNvPr id="2" name="Content Placeholder 1"/>
+          <p:cNvSpPr>
+            <a:spLocks noGrp="1"/>
+          </p:cNvSpPr>
+          <p:nvPr>
+            <p:ph idx="1"/>
+          </p:nvPr>
+        </p:nvSpPr>
+        <p:spPr/>
+        <p:txBody>
+          <a:bodyPr/>
+          <a:lstStyle/>
+          <a:p>
+            <a:endParaRPr lang="en-US"/>
+          </a:p>
+        </p:txBody>
+      </p:sp>
+      <p:sp>
+        <p:nvSpPr>
+          <p:cNvPr id="3" name="Title 2"/>
+          <p:cNvSpPr>
+            <a:spLocks noGrp="1"/>
+          </p:cNvSpPr>
+          <p:nvPr>
+            <p:ph type="title"/>
+          </p:nvPr>
+        </p:nvSpPr>
+        <p:spPr/>
+        <p:txBody>
+          <a:bodyPr>
+            <a:normAutofit fontScale="90000"/>
+          </a:bodyPr>
+          <a:lstStyle/>
+          <a:p>
+            <a:r>
+              <a:rPr lang="ru-RU" dirty="0" smtClean="0"/>
+              <a:t>модел</a:t>
+            </a:r>
+            <a:r>
+              <a:rPr lang="en-US" dirty="0" smtClean="0"/>
+              <a:t>ь</a:t>
+            </a:r>
+            <a:r>
+              <a:rPr lang="ru-RU" dirty="0" smtClean="0"/>
+              <a:t> </a:t>
+            </a:r>
+            <a:r>
+              <a:rPr lang="ru-RU" dirty="0" smtClean="0"/>
+              <a:t>изображения морской поверхности в области солнечного блика </a:t>
+            </a:r>
+            <a:endParaRPr lang="en-US" dirty="0"/>
+          </a:p>
+        </p:txBody>
+      </p:sp>
+    </p:spTree>
+  </p:cSld>
+  <p:clrMapOvr>
+    <a:masterClrMapping/>
+  </p:clrMapOvr>
+</p:sld>
+</file>
+
+<file path=ppt/slides/slide9.xml><?xml version="1.0" encoding="utf-8"?>
 <p:sld xmlns:a="http://schemas.openxmlformats.org/drawingml/2006/main" xmlns:r="http://schemas.openxmlformats.org/officeDocument/2006/relationships" xmlns:p="http://schemas.openxmlformats.org/presentationml/2006/main">
   <p:cSld>
     <p:spTree>
@@ -17674,144 +20359,6 @@
           <a:p>
             <a:r>
               <a:rPr lang="ru-RU" sz="4000" dirty="0"/>
-              <a:t>Положения, выносимые на защиту</a:t>
-            </a:r>
-            <a:endParaRPr lang="en-US" sz="4000" dirty="0"/>
-          </a:p>
-        </p:txBody>
-      </p:sp>
-      <p:sp>
-        <p:nvSpPr>
-          <p:cNvPr id="3" name="Объект 2"/>
-          <p:cNvSpPr>
-            <a:spLocks noGrp="1"/>
-          </p:cNvSpPr>
-          <p:nvPr>
-            <p:ph idx="4294967295"/>
-          </p:nvPr>
-        </p:nvSpPr>
-        <p:spPr>
-          <a:xfrm>
-            <a:off x="224644" y="1451917"/>
-            <a:ext cx="8694712" cy="4929411"/>
-          </a:xfrm>
-        </p:spPr>
-        <p:txBody>
-          <a:bodyPr>
-            <a:normAutofit lnSpcReduction="10000"/>
-          </a:bodyPr>
-          <a:lstStyle/>
-          <a:p>
-            <a:r>
-              <a:rPr lang="ru-RU" dirty="0"/>
-              <a:t>При изложении основных положений диссертационного исследования следует сформулировать их как можно более лаконично и предельно просто, чтобы было понятно каждому члену совета.</a:t>
-            </a:r>
-          </a:p>
-          <a:p>
-            <a:r>
-              <a:rPr lang="ru-RU" dirty="0"/>
-              <a:t>При этом нужно помнить, что в диссертационном совете, как правило, сидят специалисты не только по вашей специальности.</a:t>
-            </a:r>
-          </a:p>
-          <a:p>
-            <a:r>
-              <a:rPr lang="ru-RU" dirty="0"/>
-              <a:t>Также необходимо выделить свою роль как исследователя и новатора, сумевшего предложить новый и оптимальный подход среди существующих</a:t>
-            </a:r>
-            <a:r>
-              <a:rPr lang="ru-RU" dirty="0" smtClean="0"/>
-              <a:t>.</a:t>
-            </a:r>
-          </a:p>
-          <a:p>
-            <a:pPr lvl="0"/>
-            <a:r>
-              <a:rPr lang="ru-RU" dirty="0" smtClean="0"/>
-              <a:t>Определяющая роль дивергенции</a:t>
-            </a:r>
-            <a:r>
-              <a:rPr lang="en-US" dirty="0" smtClean="0"/>
-              <a:t>/</a:t>
-            </a:r>
-            <a:r>
-              <a:rPr lang="ru-RU" dirty="0" smtClean="0"/>
-              <a:t>конвергенции </a:t>
-            </a:r>
-            <a:r>
-              <a:rPr lang="ru-RU" dirty="0"/>
-              <a:t>поля течений и поля поверхностной температуры в формировании РЛ проявлений динамических явлений.</a:t>
-            </a:r>
-            <a:endParaRPr lang="en-US" dirty="0"/>
-          </a:p>
-          <a:p>
-            <a:pPr marL="0" indent="0">
-              <a:buNone/>
-            </a:pPr>
-            <a:endParaRPr lang="en-US" dirty="0"/>
-          </a:p>
-        </p:txBody>
-      </p:sp>
-    </p:spTree>
-    <p:extLst>
-      <p:ext uri="{BB962C8B-B14F-4D97-AF65-F5344CB8AC3E}">
-        <p14:creationId xmlns="" xmlns:p14="http://schemas.microsoft.com/office/powerpoint/2010/main" val="2227681646"/>
-      </p:ext>
-    </p:extLst>
-  </p:cSld>
-  <p:clrMapOvr>
-    <a:masterClrMapping/>
-  </p:clrMapOvr>
-  <p:timing>
-    <p:tnLst>
-      <p:par>
-        <p:cTn id="1" dur="indefinite" restart="never" nodeType="tmRoot"/>
-      </p:par>
-    </p:tnLst>
-  </p:timing>
-</p:sld>
-</file>
-
-<file path=ppt/slides/slide6.xml><?xml version="1.0" encoding="utf-8"?>
-<p:sld xmlns:a="http://schemas.openxmlformats.org/drawingml/2006/main" xmlns:r="http://schemas.openxmlformats.org/officeDocument/2006/relationships" xmlns:p="http://schemas.openxmlformats.org/presentationml/2006/main">
-  <p:cSld>
-    <p:spTree>
-      <p:nvGrpSpPr>
-        <p:cNvPr id="1" name=""/>
-        <p:cNvGrpSpPr/>
-        <p:nvPr/>
-      </p:nvGrpSpPr>
-      <p:grpSpPr>
-        <a:xfrm>
-          <a:off x="0" y="0"/>
-          <a:ext cx="0" cy="0"/>
-          <a:chOff x="0" y="0"/>
-          <a:chExt cx="0" cy="0"/>
-        </a:xfrm>
-      </p:grpSpPr>
-      <p:sp>
-        <p:nvSpPr>
-          <p:cNvPr id="2" name="Заголовок 1"/>
-          <p:cNvSpPr>
-            <a:spLocks noGrp="1"/>
-          </p:cNvSpPr>
-          <p:nvPr>
-            <p:ph type="title" idx="4294967295"/>
-          </p:nvPr>
-        </p:nvSpPr>
-        <p:spPr>
-          <a:xfrm>
-            <a:off x="457200" y="-171400"/>
-            <a:ext cx="8229600" cy="1252537"/>
-          </a:xfrm>
-        </p:spPr>
-        <p:txBody>
-          <a:bodyPr>
-            <a:noAutofit/>
-          </a:bodyPr>
-          <a:lstStyle/>
-          <a:p>
-            <a:r>
-              <a:rPr lang="ru-RU" sz="4000" dirty="0"/>
               <a:t>Апробация работы и публикации</a:t>
             </a:r>
             <a:endParaRPr lang="en-US" sz="4000" dirty="0"/>
@@ -17948,725 +20495,16 @@
     </p:spTree>
     <p:extLst>
       <p:ext uri="{BB962C8B-B14F-4D97-AF65-F5344CB8AC3E}">
-        <p14:creationId xmlns="" xmlns:p14="http://schemas.microsoft.com/office/powerpoint/2010/main" val="3302333773"/>
+        <p14:creationId xmlns:p14="http://schemas.microsoft.com/office/powerpoint/2010/main" xmlns="" val="3302333773"/>
       </p:ext>
     </p:extLst>
   </p:cSld>
   <p:clrMapOvr>
     <a:masterClrMapping/>
   </p:clrMapOvr>
-  <p:timing>
-    <p:tnLst>
-      <p:par>
-        <p:cTn id="1" dur="indefinite" restart="never" nodeType="tmRoot"/>
-      </p:par>
-    </p:tnLst>
-  </p:timing>
-</p:sld>
-</file>
-
-<file path=ppt/slides/slide7.xml><?xml version="1.0" encoding="utf-8"?>
-<p:sld xmlns:a="http://schemas.openxmlformats.org/drawingml/2006/main" xmlns:r="http://schemas.openxmlformats.org/officeDocument/2006/relationships" xmlns:p="http://schemas.openxmlformats.org/presentationml/2006/main">
-  <p:cSld>
-    <p:spTree>
-      <p:nvGrpSpPr>
-        <p:cNvPr id="1" name=""/>
-        <p:cNvGrpSpPr/>
-        <p:nvPr/>
-      </p:nvGrpSpPr>
-      <p:grpSpPr>
-        <a:xfrm>
-          <a:off x="0" y="0"/>
-          <a:ext cx="0" cy="0"/>
-          <a:chOff x="0" y="0"/>
-          <a:chExt cx="0" cy="0"/>
-        </a:xfrm>
-      </p:grpSpPr>
-      <p:sp>
-        <p:nvSpPr>
-          <p:cNvPr id="2" name="Заголовок 1"/>
-          <p:cNvSpPr>
-            <a:spLocks noGrp="1"/>
-          </p:cNvSpPr>
-          <p:nvPr>
-            <p:ph type="title" idx="4294967295"/>
-          </p:nvPr>
-        </p:nvSpPr>
-        <p:spPr>
-          <a:xfrm>
-            <a:off x="457200" y="-171400"/>
-            <a:ext cx="8229600" cy="1252537"/>
-          </a:xfrm>
-        </p:spPr>
-        <p:txBody>
-          <a:bodyPr>
-            <a:noAutofit/>
-          </a:bodyPr>
-          <a:lstStyle/>
-          <a:p>
-            <a:r>
-              <a:rPr lang="ru-RU" sz="4000" dirty="0"/>
-              <a:t>Апробация работы и публикации</a:t>
-            </a:r>
-            <a:endParaRPr lang="en-US" sz="4000" dirty="0"/>
-          </a:p>
-        </p:txBody>
-      </p:sp>
-      <p:sp>
-        <p:nvSpPr>
-          <p:cNvPr id="3" name="Объект 2"/>
-          <p:cNvSpPr>
-            <a:spLocks noGrp="1"/>
-          </p:cNvSpPr>
-          <p:nvPr>
-            <p:ph idx="4294967295"/>
-          </p:nvPr>
-        </p:nvSpPr>
-        <p:spPr>
-          <a:xfrm>
-            <a:off x="224644" y="1556793"/>
-            <a:ext cx="8694712" cy="5184576"/>
-          </a:xfrm>
-        </p:spPr>
-        <p:txBody>
-          <a:bodyPr>
-            <a:noAutofit/>
-          </a:bodyPr>
-          <a:lstStyle/>
-          <a:p>
-            <a:r>
-              <a:rPr lang="ru-RU" sz="1400" b="1" dirty="0"/>
-              <a:t>Предложенная методика была апробирована на различных конференциях и семинарах</a:t>
-            </a:r>
-            <a:r>
-              <a:rPr lang="ru-RU" sz="1400" dirty="0"/>
-              <a:t>, а результаты исследований представлены к публикации в научных журналах, входящих в перечень изданий, рекомендованных Президиумом Высшей аттестационной комиссии и зарубежных научных журналах. По теме диссертации </a:t>
-            </a:r>
-            <a:r>
-              <a:rPr lang="ru-RU" sz="1400" b="1" dirty="0"/>
-              <a:t>опубликовано </a:t>
-            </a:r>
-            <a:r>
-              <a:rPr lang="ru-RU" sz="1400" b="1" dirty="0" smtClean="0"/>
-              <a:t>24 </a:t>
-            </a:r>
-            <a:r>
-              <a:rPr lang="ru-RU" sz="1400" b="1" dirty="0"/>
-              <a:t>печатные работы</a:t>
-            </a:r>
-            <a:r>
-              <a:rPr lang="ru-RU" sz="1400" dirty="0"/>
-              <a:t>, включая </a:t>
-            </a:r>
-            <a:r>
-              <a:rPr lang="ru-RU" sz="1400" b="1" dirty="0" smtClean="0"/>
-              <a:t>21 тезис </a:t>
-            </a:r>
-            <a:r>
-              <a:rPr lang="ru-RU" sz="1400" b="1" dirty="0"/>
-              <a:t>конференций</a:t>
-            </a:r>
-            <a:r>
-              <a:rPr lang="ru-RU" sz="1400" dirty="0"/>
-              <a:t>, </a:t>
-            </a:r>
-            <a:r>
-              <a:rPr lang="ru-RU" sz="1400" b="1" dirty="0"/>
-              <a:t>6 реферируемых изданий </a:t>
-            </a:r>
-            <a:r>
-              <a:rPr lang="ru-RU" sz="1400" dirty="0"/>
-              <a:t>и </a:t>
-            </a:r>
-            <a:r>
-              <a:rPr lang="ru-RU" sz="1400" b="1" dirty="0"/>
-              <a:t>4 патента</a:t>
-            </a:r>
-            <a:r>
-              <a:rPr lang="ru-RU" sz="1400" dirty="0" smtClean="0"/>
-              <a:t>.</a:t>
-            </a:r>
-            <a:endParaRPr lang="ru-RU" sz="1400" dirty="0"/>
-          </a:p>
-          <a:p>
-            <a:pPr marL="0" indent="0">
-              <a:buNone/>
-            </a:pPr>
-            <a:r>
-              <a:rPr lang="ru-RU" sz="1400" dirty="0"/>
-              <a:t>Среди перечисленных, стоит отметить следующие конференции:</a:t>
-            </a:r>
-          </a:p>
-          <a:p>
-            <a:pPr marL="0" indent="0">
-              <a:buNone/>
-            </a:pPr>
-            <a:r>
-              <a:rPr lang="ru-RU" sz="1400" dirty="0"/>
-              <a:t>1.	</a:t>
-            </a:r>
-            <a:r>
-              <a:rPr lang="en-US" sz="1400" dirty="0"/>
-              <a:t>Myasoedov A.G., Kudryavtsev V.N. SAR and optical imagery of mesa scale ocean currents. 7th All </a:t>
-            </a:r>
-            <a:r>
-              <a:rPr lang="en-US" sz="1400" dirty="0" err="1"/>
-              <a:t>russian</a:t>
-            </a:r>
-            <a:r>
-              <a:rPr lang="en-US" sz="1400" dirty="0"/>
-              <a:t> Opened Conference “</a:t>
-            </a:r>
-            <a:r>
-              <a:rPr lang="en-US" sz="1400" b="1" dirty="0"/>
-              <a:t>Modern Problems of Earth Remote Sensing from Space</a:t>
-            </a:r>
-            <a:r>
-              <a:rPr lang="en-US" sz="1400" dirty="0"/>
-              <a:t>”, Moscow, Russia, November 2009.</a:t>
-            </a:r>
-          </a:p>
-          <a:p>
-            <a:pPr marL="0" indent="0">
-              <a:buNone/>
-            </a:pPr>
-            <a:r>
-              <a:rPr lang="en-US" sz="1400" dirty="0"/>
-              <a:t>2.	Myasoedov, A., V. Kudryavtsev, B. Chapron, and J. Johannessen, (2010). Sun glitter imagery of the ocean phenomena, Proc. </a:t>
-            </a:r>
-            <a:r>
-              <a:rPr lang="en-US" sz="1400" b="1" dirty="0"/>
-              <a:t>3rd </a:t>
-            </a:r>
-            <a:r>
-              <a:rPr lang="en-US" sz="1400" b="1" dirty="0" err="1"/>
-              <a:t>SeaSAR</a:t>
-            </a:r>
-            <a:r>
-              <a:rPr lang="en-US" sz="1400" b="1" dirty="0"/>
-              <a:t> workshop </a:t>
-            </a:r>
-            <a:r>
-              <a:rPr lang="en-US" sz="1400" dirty="0"/>
-              <a:t>“Advances in SAR Oceanography from ENVISAT, ERS and ESA third party missions”, ESA SP679.</a:t>
-            </a:r>
-          </a:p>
-          <a:p>
-            <a:pPr marL="0" indent="0">
-              <a:buNone/>
-            </a:pPr>
-            <a:r>
-              <a:rPr lang="ru-RU" sz="1400" dirty="0" smtClean="0"/>
-              <a:t>3</a:t>
-            </a:r>
-            <a:r>
-              <a:rPr lang="en-US" sz="1400" dirty="0" smtClean="0"/>
-              <a:t>.	Myasoedov A., Kudryavtsev V., Chapron B., Johannessen J., (2010). SAR and Optical Imagery of Mesoscale Ocean Currents. Proceedings of the </a:t>
-            </a:r>
-            <a:r>
-              <a:rPr lang="en-US" sz="1400" b="1" dirty="0" smtClean="0"/>
-              <a:t>ESA Living Planet Symposium 2010</a:t>
-            </a:r>
-            <a:r>
-              <a:rPr lang="en-US" sz="1400" dirty="0" smtClean="0"/>
-              <a:t>, Bergen, Norway, ESA SP-686.</a:t>
-            </a:r>
-          </a:p>
-          <a:p>
-            <a:pPr marL="0" indent="0">
-              <a:buNone/>
-            </a:pPr>
-            <a:r>
-              <a:rPr lang="ru-RU" sz="1400" dirty="0" smtClean="0"/>
-              <a:t>4</a:t>
-            </a:r>
-            <a:r>
-              <a:rPr lang="en-US" sz="1400" dirty="0" smtClean="0"/>
-              <a:t>.</a:t>
-            </a:r>
-            <a:r>
-              <a:rPr lang="en-US" sz="1400" dirty="0"/>
-              <a:t>	Myasoedov A., V. Kudryavtsev, B. Chapron, J. Johannessen, and F. Collard. Sun glitter as a "tool" for monitoring the Ocean from Space. </a:t>
-            </a:r>
-            <a:r>
-              <a:rPr lang="en-US" sz="1400" b="1" dirty="0"/>
-              <a:t>39th COSPAR Scientific Assembly</a:t>
-            </a:r>
-            <a:r>
-              <a:rPr lang="en-US" sz="1400" dirty="0"/>
-              <a:t>, 14-22 July 2012, Mysore, India.</a:t>
-            </a:r>
-          </a:p>
-          <a:p>
-            <a:pPr marL="0" indent="0">
-              <a:buNone/>
-            </a:pPr>
-            <a:r>
-              <a:rPr lang="ru-RU" sz="1400" dirty="0" smtClean="0"/>
-              <a:t>5</a:t>
-            </a:r>
-            <a:r>
-              <a:rPr lang="en-US" sz="1400" dirty="0" smtClean="0"/>
-              <a:t>.	Myasoedov </a:t>
-            </a:r>
-            <a:r>
-              <a:rPr lang="en-US" sz="1400" dirty="0"/>
-              <a:t>A., V. Kudryavtsev, B. Chapron, F. Collard and J. Johannessen. On dual-polarized SAR measurements of the Ocean surface. 6th International Workshop on Science and Applications of SAR Polarimetry and Polarimetric Interferometry, </a:t>
-            </a:r>
-            <a:r>
-              <a:rPr lang="en-US" sz="1400" b="1" dirty="0" err="1"/>
-              <a:t>POLinSAR</a:t>
-            </a:r>
-            <a:r>
-              <a:rPr lang="en-US" sz="1400" b="1" dirty="0"/>
-              <a:t> 2013</a:t>
-            </a:r>
-            <a:r>
-              <a:rPr lang="en-US" sz="1400" dirty="0"/>
-              <a:t>, 28 January – 1February 2013, Frascati (Rome), Italy</a:t>
-            </a:r>
-            <a:r>
-              <a:rPr lang="en-US" sz="1400" dirty="0" smtClean="0"/>
-              <a:t>.</a:t>
-            </a:r>
-            <a:endParaRPr lang="ru-RU" sz="1400" dirty="0" smtClean="0"/>
-          </a:p>
-          <a:p>
-            <a:pPr marL="0" indent="0">
-              <a:buNone/>
-            </a:pPr>
-            <a:endParaRPr lang="en-US" sz="1400" dirty="0"/>
-          </a:p>
-          <a:p>
-            <a:r>
-              <a:rPr lang="ru-RU" sz="1400" dirty="0"/>
-              <a:t>Результаты проделанной работы также докладывались и обсуждались на различных </a:t>
-            </a:r>
-            <a:r>
-              <a:rPr lang="ru-RU" sz="1400" b="1" dirty="0"/>
-              <a:t>международных научных семинарах</a:t>
-            </a:r>
-            <a:r>
-              <a:rPr lang="ru-RU" sz="1400" dirty="0"/>
-              <a:t> как за рубежом (в </a:t>
-            </a:r>
-            <a:r>
-              <a:rPr lang="ru-RU" sz="1400" b="1" dirty="0"/>
-              <a:t>Норвегии</a:t>
-            </a:r>
-            <a:r>
-              <a:rPr lang="ru-RU" sz="1400" dirty="0"/>
-              <a:t>, </a:t>
-            </a:r>
-            <a:r>
-              <a:rPr lang="ru-RU" sz="1400" b="1" dirty="0"/>
-              <a:t>Франции</a:t>
-            </a:r>
-            <a:r>
-              <a:rPr lang="ru-RU" sz="1400" dirty="0"/>
-              <a:t>, </a:t>
-            </a:r>
-            <a:r>
-              <a:rPr lang="ru-RU" sz="1400" b="1" dirty="0"/>
-              <a:t>Финляндии</a:t>
-            </a:r>
-            <a:r>
-              <a:rPr lang="ru-RU" sz="1400" dirty="0"/>
-              <a:t> и </a:t>
-            </a:r>
-            <a:r>
-              <a:rPr lang="ru-RU" sz="1400" b="1" dirty="0"/>
-              <a:t>Италии</a:t>
-            </a:r>
-            <a:r>
-              <a:rPr lang="ru-RU" sz="1400" dirty="0"/>
-              <a:t>), так и в </a:t>
-            </a:r>
-            <a:r>
-              <a:rPr lang="ru-RU" sz="1400" b="1" dirty="0"/>
-              <a:t>России</a:t>
-            </a:r>
-            <a:r>
-              <a:rPr lang="ru-RU" sz="1400" dirty="0"/>
-              <a:t>.</a:t>
-            </a:r>
-          </a:p>
-        </p:txBody>
-      </p:sp>
-    </p:spTree>
-    <p:extLst>
-      <p:ext uri="{BB962C8B-B14F-4D97-AF65-F5344CB8AC3E}">
-        <p14:creationId xmlns="" xmlns:p14="http://schemas.microsoft.com/office/powerpoint/2010/main" val="1826961429"/>
-      </p:ext>
-    </p:extLst>
-  </p:cSld>
-  <p:clrMapOvr>
-    <a:masterClrMapping/>
-  </p:clrMapOvr>
-  <p:timing>
-    <p:tnLst>
-      <p:par>
-        <p:cTn id="1" dur="indefinite" restart="never" nodeType="tmRoot"/>
-      </p:par>
-    </p:tnLst>
-  </p:timing>
-</p:sld>
-</file>
-
-<file path=ppt/slides/slide8.xml><?xml version="1.0" encoding="utf-8"?>
-<p:sld xmlns:a="http://schemas.openxmlformats.org/drawingml/2006/main" xmlns:r="http://schemas.openxmlformats.org/officeDocument/2006/relationships" xmlns:p="http://schemas.openxmlformats.org/presentationml/2006/main">
-  <p:cSld>
-    <p:spTree>
-      <p:nvGrpSpPr>
-        <p:cNvPr id="1" name=""/>
-        <p:cNvGrpSpPr/>
-        <p:nvPr/>
-      </p:nvGrpSpPr>
-      <p:grpSpPr>
-        <a:xfrm>
-          <a:off x="0" y="0"/>
-          <a:ext cx="0" cy="0"/>
-          <a:chOff x="0" y="0"/>
-          <a:chExt cx="0" cy="0"/>
-        </a:xfrm>
-      </p:grpSpPr>
-      <p:sp>
-        <p:nvSpPr>
-          <p:cNvPr id="2" name="Заголовок 1"/>
-          <p:cNvSpPr>
-            <a:spLocks noGrp="1"/>
-          </p:cNvSpPr>
-          <p:nvPr>
-            <p:ph type="title" idx="4294967295"/>
-          </p:nvPr>
-        </p:nvSpPr>
-        <p:spPr>
-          <a:xfrm>
-            <a:off x="457200" y="88231"/>
-            <a:ext cx="8229600" cy="1252537"/>
-          </a:xfrm>
-        </p:spPr>
-        <p:txBody>
-          <a:bodyPr>
-            <a:noAutofit/>
-          </a:bodyPr>
-          <a:lstStyle/>
-          <a:p>
-            <a:pPr algn="r"/>
-            <a:r>
-              <a:rPr lang="ru-RU" sz="4000" dirty="0"/>
-              <a:t>Список работ, опубликованных по теме диссертации</a:t>
-            </a:r>
-            <a:endParaRPr lang="en-US" sz="4000" dirty="0"/>
-          </a:p>
-        </p:txBody>
-      </p:sp>
-      <p:sp>
-        <p:nvSpPr>
-          <p:cNvPr id="3" name="Объект 2"/>
-          <p:cNvSpPr>
-            <a:spLocks noGrp="1"/>
-          </p:cNvSpPr>
-          <p:nvPr>
-            <p:ph idx="4294967295"/>
-          </p:nvPr>
-        </p:nvSpPr>
-        <p:spPr>
-          <a:xfrm>
-            <a:off x="224644" y="1412776"/>
-            <a:ext cx="8694712" cy="5184576"/>
-          </a:xfrm>
-        </p:spPr>
-        <p:txBody>
-          <a:bodyPr>
-            <a:noAutofit/>
-          </a:bodyPr>
-          <a:lstStyle/>
-          <a:p>
-            <a:r>
-              <a:rPr lang="ru-RU" sz="1600" b="1" i="1" dirty="0"/>
-              <a:t>Издания из списка ВАК и зарубежные журналы</a:t>
-            </a:r>
-            <a:endParaRPr lang="en-US" sz="1600" b="1" i="1" dirty="0"/>
-          </a:p>
-          <a:p>
-            <a:r>
-              <a:rPr lang="en-US" sz="1600" dirty="0"/>
-              <a:t>1. </a:t>
-            </a:r>
-            <a:r>
-              <a:rPr lang="en-US" sz="1600" b="1" dirty="0"/>
-              <a:t>Myasoedov A.G.</a:t>
-            </a:r>
-            <a:r>
-              <a:rPr lang="en-US" sz="1600" dirty="0"/>
-              <a:t>, Kudryavtsev V.N. Quantification of the surface manifestation of ocean phenomena from sun glitter imagery. // Proceedings of the Russian State Hydrometeorological University. A theoretical research journal. 2010. </a:t>
-            </a:r>
-            <a:r>
-              <a:rPr lang="ru-RU" sz="1600" dirty="0"/>
-              <a:t>С</a:t>
-            </a:r>
-            <a:r>
-              <a:rPr lang="en-US" sz="1600" dirty="0"/>
-              <a:t>. 94–115.</a:t>
-            </a:r>
-          </a:p>
-          <a:p>
-            <a:r>
-              <a:rPr lang="en-US" sz="1600" dirty="0"/>
-              <a:t>2. Kozlov I.E., Kudryavtsev V.N., Johannessen J.A., Chapron B., Dailidienė I., </a:t>
-            </a:r>
-            <a:r>
-              <a:rPr lang="en-US" sz="1600" b="1" dirty="0"/>
-              <a:t>Myasoedov A.G.</a:t>
-            </a:r>
-            <a:r>
-              <a:rPr lang="en-US" sz="1600" dirty="0"/>
-              <a:t> ASAR imaging for coastal upwelling in the Baltic Sea. // Advances in Space Research. 2012. № 50. С. 1125–1137.</a:t>
-            </a:r>
-          </a:p>
-          <a:p>
-            <a:r>
-              <a:rPr lang="en-US" sz="1600" dirty="0"/>
-              <a:t>3. Kudryavtsev V., </a:t>
-            </a:r>
-            <a:r>
-              <a:rPr lang="en-US" sz="1600" b="1" dirty="0"/>
-              <a:t>Myasoedov A.</a:t>
-            </a:r>
-            <a:r>
-              <a:rPr lang="en-US" sz="1600" dirty="0"/>
-              <a:t>, Chapron B., Johannessen J.A., Collard F. Imaging mesoscale upper ocean dynamics using synthetic aperture radar and optical data. // Journal of Geophysical Research. 2012. № 117. С. C04029.</a:t>
-            </a:r>
-          </a:p>
-          <a:p>
-            <a:r>
-              <a:rPr lang="en-US" sz="1600" dirty="0"/>
-              <a:t>4. Kudryavtsev V., </a:t>
-            </a:r>
-            <a:r>
-              <a:rPr lang="en-US" sz="1600" b="1" dirty="0"/>
-              <a:t>Myasoedov A.</a:t>
-            </a:r>
-            <a:r>
-              <a:rPr lang="en-US" sz="1600" dirty="0"/>
-              <a:t>, Chapron B., Johannessen J.A., Collard F. Joint sun-glitter and radar imagery of surface slicks. // Remote Sensing of Environment. 2012. № 120. С. 123–132.</a:t>
-            </a:r>
-          </a:p>
-          <a:p>
-            <a:r>
-              <a:rPr lang="en-US" sz="1600" dirty="0"/>
-              <a:t>5. Kudryavtsev V.N., Chapron B., </a:t>
-            </a:r>
-            <a:r>
-              <a:rPr lang="en-US" sz="1600" b="1" dirty="0"/>
-              <a:t>Myasoedov A.G.</a:t>
-            </a:r>
-            <a:r>
-              <a:rPr lang="en-US" sz="1600" dirty="0"/>
-              <a:t>, Collard F., Johannessen J.A. On Dual Co-Polarized SAR Measurements of the Ocean Surface. // IEEE Geoscience and Remote Sensing Letters. 2013. № PP. С. 1–5.</a:t>
-            </a:r>
-          </a:p>
-          <a:p>
-            <a:r>
-              <a:rPr lang="ru-RU" sz="1600" dirty="0"/>
-              <a:t>6. Зимин А.В., Родионов А.А., Шапрон Б., </a:t>
-            </a:r>
-            <a:r>
-              <a:rPr lang="ru-RU" sz="1600" dirty="0" err="1"/>
-              <a:t>Романенков</a:t>
-            </a:r>
-            <a:r>
-              <a:rPr lang="ru-RU" sz="1600" dirty="0"/>
-              <a:t> Д.А., </a:t>
-            </a:r>
-            <a:r>
-              <a:rPr lang="ru-RU" sz="1600" dirty="0" err="1"/>
-              <a:t>Здоровеннов</a:t>
-            </a:r>
-            <a:r>
-              <a:rPr lang="ru-RU" sz="1600" dirty="0"/>
-              <a:t> Р.Э., Козлов И.Е., </a:t>
-            </a:r>
-            <a:r>
-              <a:rPr lang="ru-RU" sz="1600" b="1" dirty="0"/>
-              <a:t>Мясоедов А.Г.</a:t>
-            </a:r>
-            <a:r>
-              <a:rPr lang="ru-RU" sz="1600" dirty="0"/>
-              <a:t>, Шевчук О.И. Работы с научно-исследовательского судна «Эколог» по проекту «Мегагрант» в белом море, выполненные в июле-августе 2012 года. // Учёные записки Российского государственного гидрометеорологического университета. 2013. (в печати)</a:t>
-            </a:r>
-          </a:p>
-        </p:txBody>
-      </p:sp>
-    </p:spTree>
-    <p:extLst>
-      <p:ext uri="{BB962C8B-B14F-4D97-AF65-F5344CB8AC3E}">
-        <p14:creationId xmlns="" xmlns:p14="http://schemas.microsoft.com/office/powerpoint/2010/main" val="2273188979"/>
-      </p:ext>
-    </p:extLst>
-  </p:cSld>
-  <p:clrMapOvr>
-    <a:masterClrMapping/>
-  </p:clrMapOvr>
-  <p:timing>
-    <p:tnLst>
-      <p:par>
-        <p:cTn id="1" dur="indefinite" restart="never" nodeType="tmRoot"/>
-      </p:par>
-    </p:tnLst>
-  </p:timing>
-</p:sld>
-</file>
-
-<file path=ppt/slides/slide9.xml><?xml version="1.0" encoding="utf-8"?>
-<p:sld xmlns:a="http://schemas.openxmlformats.org/drawingml/2006/main" xmlns:r="http://schemas.openxmlformats.org/officeDocument/2006/relationships" xmlns:p="http://schemas.openxmlformats.org/presentationml/2006/main">
-  <p:cSld>
-    <p:spTree>
-      <p:nvGrpSpPr>
-        <p:cNvPr id="1" name=""/>
-        <p:cNvGrpSpPr/>
-        <p:nvPr/>
-      </p:nvGrpSpPr>
-      <p:grpSpPr>
-        <a:xfrm>
-          <a:off x="0" y="0"/>
-          <a:ext cx="0" cy="0"/>
-          <a:chOff x="0" y="0"/>
-          <a:chExt cx="0" cy="0"/>
-        </a:xfrm>
-      </p:grpSpPr>
-      <p:sp>
-        <p:nvSpPr>
-          <p:cNvPr id="2" name="Заголовок 1"/>
-          <p:cNvSpPr>
-            <a:spLocks noGrp="1"/>
-          </p:cNvSpPr>
-          <p:nvPr>
-            <p:ph type="title" idx="4294967295"/>
-          </p:nvPr>
-        </p:nvSpPr>
-        <p:spPr>
-          <a:xfrm>
-            <a:off x="457200" y="88231"/>
-            <a:ext cx="8229600" cy="1252537"/>
-          </a:xfrm>
-        </p:spPr>
-        <p:txBody>
-          <a:bodyPr>
-            <a:noAutofit/>
-          </a:bodyPr>
-          <a:lstStyle/>
-          <a:p>
-            <a:pPr algn="r"/>
-            <a:r>
-              <a:rPr lang="ru-RU" sz="4000" dirty="0"/>
-              <a:t>Список работ, опубликованных по теме диссертации</a:t>
-            </a:r>
-            <a:endParaRPr lang="en-US" sz="4000" dirty="0"/>
-          </a:p>
-        </p:txBody>
-      </p:sp>
-      <p:sp>
-        <p:nvSpPr>
-          <p:cNvPr id="3" name="Объект 2"/>
-          <p:cNvSpPr>
-            <a:spLocks noGrp="1"/>
-          </p:cNvSpPr>
-          <p:nvPr>
-            <p:ph idx="4294967295"/>
-          </p:nvPr>
-        </p:nvSpPr>
-        <p:spPr>
-          <a:xfrm>
-            <a:off x="224644" y="1340768"/>
-            <a:ext cx="8694712" cy="5400600"/>
-          </a:xfrm>
-        </p:spPr>
-        <p:txBody>
-          <a:bodyPr>
-            <a:noAutofit/>
-          </a:bodyPr>
-          <a:lstStyle/>
-          <a:p>
-            <a:r>
-              <a:rPr lang="ru-RU" sz="1600" b="1" i="1" dirty="0"/>
-              <a:t>Патенты</a:t>
-            </a:r>
-            <a:endParaRPr lang="en-US" sz="1600" b="1" i="1" dirty="0"/>
-          </a:p>
-          <a:p>
-            <a:pPr lvl="0"/>
-            <a:r>
-              <a:rPr lang="ru-RU" sz="1600" b="1" dirty="0"/>
-              <a:t>Мясоедов А.Г.</a:t>
-            </a:r>
-            <a:r>
-              <a:rPr lang="ru-RU" sz="1600" dirty="0"/>
-              <a:t>, Кудрявцев В.Н. Свидетельство о государственной регистрации программы для ЭВМ №2011610860: GLAMOROS: Оценка контрастов поверхностных проявлений океанических явлений по изображениям солнечного блика. Заявка № 2010617455. Дата поступления 22 ноября 2010г. Зарегистрировано в Реестре программ для ЭВМ 20 января 2011г.</a:t>
-            </a:r>
-            <a:endParaRPr lang="en-US" sz="1600" dirty="0"/>
-          </a:p>
-          <a:p>
-            <a:pPr lvl="0"/>
-            <a:r>
-              <a:rPr lang="ru-RU" sz="1600" b="1" dirty="0"/>
-              <a:t>Мясоедов А.Г.</a:t>
-            </a:r>
-            <a:r>
-              <a:rPr lang="ru-RU" sz="1600" dirty="0"/>
-              <a:t>, Кудрявцев В.Н., Шапрон Б.Ж.А., Коллард Ф.Ж.К. Свидетельство о государственной регистрации программы для ЭВМ №2012660424 DUPOL: «Оценка характеристик поверхности Океана по двух-поляризационным радиолокационным изображениям из Космоса» Заявка № 2012617706. Дата поступления 9 октября 2012г. Зарегистрировано в Реестре программ для ЭВМ 19 ноября 2012г.</a:t>
-            </a:r>
-            <a:endParaRPr lang="en-US" sz="1600" dirty="0"/>
-          </a:p>
-          <a:p>
-            <a:pPr lvl="0"/>
-            <a:r>
-              <a:rPr lang="ru-RU" sz="1600" b="1" dirty="0"/>
-              <a:t>Мясоедов А.Г.</a:t>
-            </a:r>
-            <a:r>
-              <a:rPr lang="ru-RU" sz="1600" dirty="0"/>
-              <a:t>, Козлов И.Е. Свидетельство о государственной регистрации программы для ЭВМ №2012660637 INTERWAVE: «Определение характеристик океанских внутренних волн по их проявлениям в спутниковых радиолокационных снимках морской поверхности» Заявка № 2012618623. Дата поступления 10 октября 2012г. Зарегистрировано в Реестре программ для ЭВМ 26 ноября 2012г.</a:t>
-            </a:r>
-            <a:endParaRPr lang="en-US" sz="1600" dirty="0"/>
-          </a:p>
-          <a:p>
-            <a:pPr lvl="0"/>
-            <a:r>
-              <a:rPr lang="ru-RU" sz="1600" dirty="0"/>
-              <a:t>Зимин А.В., Козлов И.Е., </a:t>
-            </a:r>
-            <a:r>
-              <a:rPr lang="ru-RU" sz="1600" b="1" dirty="0"/>
-              <a:t>Мясоедов А.Г.</a:t>
-            </a:r>
-            <a:r>
-              <a:rPr lang="ru-RU" sz="1600" dirty="0"/>
-              <a:t>, </a:t>
-            </a:r>
-            <a:r>
-              <a:rPr lang="ru-RU" sz="1600" dirty="0" err="1"/>
-              <a:t>Мохнаткин</a:t>
-            </a:r>
-            <a:r>
-              <a:rPr lang="ru-RU" sz="1600" dirty="0"/>
-              <a:t> Ф.Ю. Свидетельство о государственной регистрации базы данных №2012621188 «Проявления внутренних волн по данным контактных и спутниковых наблюдений в Белом море в 2010 году (ВВ БМ 2010)» Заявка № 2012621065. Дата поступления 9 октября 2012г. Зарегистрировано в Реестре баз данных 19 ноября 2012г.</a:t>
-            </a:r>
-            <a:endParaRPr lang="en-US" sz="1600" dirty="0"/>
-          </a:p>
-        </p:txBody>
-      </p:sp>
-    </p:spTree>
-    <p:extLst>
-      <p:ext uri="{BB962C8B-B14F-4D97-AF65-F5344CB8AC3E}">
-        <p14:creationId xmlns="" xmlns:p14="http://schemas.microsoft.com/office/powerpoint/2010/main" val="166832219"/>
-      </p:ext>
-    </p:extLst>
-  </p:cSld>
-  <p:clrMapOvr>
-    <a:masterClrMapping/>
-  </p:clrMapOvr>
+  <p:transition>
+    <p:fade/>
+  </p:transition>
   <p:timing>
     <p:tnLst>
       <p:par>

</xml_diff>